<commit_message>
adding 2022 python example
</commit_message>
<xml_diff>
--- a/2020/training/Balls.pptx
+++ b/2020/training/Balls.pptx
@@ -6,6 +6,13 @@
   </p:sldMasterIdLst>
   <p:sldIdLst>
     <p:sldId id="256" r:id="rId2"/>
+    <p:sldId id="263" r:id="rId3"/>
+    <p:sldId id="259" r:id="rId4"/>
+    <p:sldId id="257" r:id="rId5"/>
+    <p:sldId id="258" r:id="rId6"/>
+    <p:sldId id="260" r:id="rId7"/>
+    <p:sldId id="261" r:id="rId8"/>
+    <p:sldId id="262" r:id="rId9"/>
   </p:sldIdLst>
   <p:sldSz cx="12192000" cy="6858000"/>
   <p:notesSz cx="6858000" cy="9144000"/>
@@ -104,6 +111,11 @@
       </a:defRPr>
     </a:lvl9pPr>
   </p:defaultTextStyle>
+  <p:extLst>
+    <p:ext uri="{EFAFB233-063F-42B5-8137-9DF3F51BA10A}">
+      <p15:sldGuideLst xmlns:p15="http://schemas.microsoft.com/office/powerpoint/2012/main"/>
+    </p:ext>
+  </p:extLst>
 </p:presentation>
 </file>
 
@@ -149,10 +161,9 @@
           </a:lstStyle>
           <a:p>
             <a:r>
-              <a:rPr lang="en-US" smtClean="0"/>
+              <a:rPr lang="en-US"/>
               <a:t>Click to edit Master title style</a:t>
             </a:r>
-            <a:endParaRPr lang="en-US"/>
           </a:p>
         </p:txBody>
       </p:sp>
@@ -214,10 +225,9 @@
           </a:lstStyle>
           <a:p>
             <a:r>
-              <a:rPr lang="en-US" smtClean="0"/>
+              <a:rPr lang="en-US"/>
               <a:t>Click to edit Master subtitle style</a:t>
             </a:r>
-            <a:endParaRPr lang="en-US"/>
           </a:p>
         </p:txBody>
       </p:sp>
@@ -238,7 +248,7 @@
           <a:p>
             <a:fld id="{F464B8FA-1A17-4AED-A84C-27E00D534571}" type="datetimeFigureOut">
               <a:rPr lang="en-US" smtClean="0"/>
-              <a:t>2/4/2020</a:t>
+              <a:t>1/13/2022</a:t>
             </a:fld>
             <a:endParaRPr lang="en-US"/>
           </a:p>
@@ -332,10 +342,9 @@
           <a:lstStyle/>
           <a:p>
             <a:r>
-              <a:rPr lang="en-US" smtClean="0"/>
+              <a:rPr lang="en-US"/>
               <a:t>Click to edit Master title style</a:t>
             </a:r>
-            <a:endParaRPr lang="en-US"/>
           </a:p>
         </p:txBody>
       </p:sp>
@@ -356,38 +365,37 @@
           <a:p>
             <a:pPr lvl="0"/>
             <a:r>
-              <a:rPr lang="en-US" smtClean="0"/>
+              <a:rPr lang="en-US"/>
               <a:t>Edit Master text styles</a:t>
             </a:r>
           </a:p>
           <a:p>
             <a:pPr lvl="1"/>
             <a:r>
-              <a:rPr lang="en-US" smtClean="0"/>
+              <a:rPr lang="en-US"/>
               <a:t>Second level</a:t>
             </a:r>
           </a:p>
           <a:p>
             <a:pPr lvl="2"/>
             <a:r>
-              <a:rPr lang="en-US" smtClean="0"/>
+              <a:rPr lang="en-US"/>
               <a:t>Third level</a:t>
             </a:r>
           </a:p>
           <a:p>
             <a:pPr lvl="3"/>
             <a:r>
-              <a:rPr lang="en-US" smtClean="0"/>
+              <a:rPr lang="en-US"/>
               <a:t>Fourth level</a:t>
             </a:r>
           </a:p>
           <a:p>
             <a:pPr lvl="4"/>
             <a:r>
-              <a:rPr lang="en-US" smtClean="0"/>
+              <a:rPr lang="en-US"/>
               <a:t>Fifth level</a:t>
             </a:r>
-            <a:endParaRPr lang="en-US"/>
           </a:p>
         </p:txBody>
       </p:sp>
@@ -408,7 +416,7 @@
           <a:p>
             <a:fld id="{F464B8FA-1A17-4AED-A84C-27E00D534571}" type="datetimeFigureOut">
               <a:rPr lang="en-US" smtClean="0"/>
-              <a:t>2/4/2020</a:t>
+              <a:t>1/13/2022</a:t>
             </a:fld>
             <a:endParaRPr lang="en-US"/>
           </a:p>
@@ -507,10 +515,9 @@
           <a:lstStyle/>
           <a:p>
             <a:r>
-              <a:rPr lang="en-US" smtClean="0"/>
+              <a:rPr lang="en-US"/>
               <a:t>Click to edit Master title style</a:t>
             </a:r>
-            <a:endParaRPr lang="en-US"/>
           </a:p>
         </p:txBody>
       </p:sp>
@@ -536,38 +543,37 @@
           <a:p>
             <a:pPr lvl="0"/>
             <a:r>
-              <a:rPr lang="en-US" smtClean="0"/>
+              <a:rPr lang="en-US"/>
               <a:t>Edit Master text styles</a:t>
             </a:r>
           </a:p>
           <a:p>
             <a:pPr lvl="1"/>
             <a:r>
-              <a:rPr lang="en-US" smtClean="0"/>
+              <a:rPr lang="en-US"/>
               <a:t>Second level</a:t>
             </a:r>
           </a:p>
           <a:p>
             <a:pPr lvl="2"/>
             <a:r>
-              <a:rPr lang="en-US" smtClean="0"/>
+              <a:rPr lang="en-US"/>
               <a:t>Third level</a:t>
             </a:r>
           </a:p>
           <a:p>
             <a:pPr lvl="3"/>
             <a:r>
-              <a:rPr lang="en-US" smtClean="0"/>
+              <a:rPr lang="en-US"/>
               <a:t>Fourth level</a:t>
             </a:r>
           </a:p>
           <a:p>
             <a:pPr lvl="4"/>
             <a:r>
-              <a:rPr lang="en-US" smtClean="0"/>
+              <a:rPr lang="en-US"/>
               <a:t>Fifth level</a:t>
             </a:r>
-            <a:endParaRPr lang="en-US"/>
           </a:p>
         </p:txBody>
       </p:sp>
@@ -588,7 +594,7 @@
           <a:p>
             <a:fld id="{F464B8FA-1A17-4AED-A84C-27E00D534571}" type="datetimeFigureOut">
               <a:rPr lang="en-US" smtClean="0"/>
-              <a:t>2/4/2020</a:t>
+              <a:t>1/13/2022</a:t>
             </a:fld>
             <a:endParaRPr lang="en-US"/>
           </a:p>
@@ -682,10 +688,9 @@
           <a:lstStyle/>
           <a:p>
             <a:r>
-              <a:rPr lang="en-US" smtClean="0"/>
+              <a:rPr lang="en-US"/>
               <a:t>Click to edit Master title style</a:t>
             </a:r>
-            <a:endParaRPr lang="en-US"/>
           </a:p>
         </p:txBody>
       </p:sp>
@@ -706,38 +711,37 @@
           <a:p>
             <a:pPr lvl="0"/>
             <a:r>
-              <a:rPr lang="en-US" smtClean="0"/>
+              <a:rPr lang="en-US"/>
               <a:t>Edit Master text styles</a:t>
             </a:r>
           </a:p>
           <a:p>
             <a:pPr lvl="1"/>
             <a:r>
-              <a:rPr lang="en-US" smtClean="0"/>
+              <a:rPr lang="en-US"/>
               <a:t>Second level</a:t>
             </a:r>
           </a:p>
           <a:p>
             <a:pPr lvl="2"/>
             <a:r>
-              <a:rPr lang="en-US" smtClean="0"/>
+              <a:rPr lang="en-US"/>
               <a:t>Third level</a:t>
             </a:r>
           </a:p>
           <a:p>
             <a:pPr lvl="3"/>
             <a:r>
-              <a:rPr lang="en-US" smtClean="0"/>
+              <a:rPr lang="en-US"/>
               <a:t>Fourth level</a:t>
             </a:r>
           </a:p>
           <a:p>
             <a:pPr lvl="4"/>
             <a:r>
-              <a:rPr lang="en-US" smtClean="0"/>
+              <a:rPr lang="en-US"/>
               <a:t>Fifth level</a:t>
             </a:r>
-            <a:endParaRPr lang="en-US"/>
           </a:p>
         </p:txBody>
       </p:sp>
@@ -758,7 +762,7 @@
           <a:p>
             <a:fld id="{F464B8FA-1A17-4AED-A84C-27E00D534571}" type="datetimeFigureOut">
               <a:rPr lang="en-US" smtClean="0"/>
-              <a:t>2/4/2020</a:t>
+              <a:t>1/13/2022</a:t>
             </a:fld>
             <a:endParaRPr lang="en-US"/>
           </a:p>
@@ -861,10 +865,9 @@
           </a:lstStyle>
           <a:p>
             <a:r>
-              <a:rPr lang="en-US" smtClean="0"/>
+              <a:rPr lang="en-US"/>
               <a:t>Click to edit Master title style</a:t>
             </a:r>
-            <a:endParaRPr lang="en-US"/>
           </a:p>
         </p:txBody>
       </p:sp>
@@ -981,7 +984,7 @@
           <a:p>
             <a:pPr lvl="0"/>
             <a:r>
-              <a:rPr lang="en-US" smtClean="0"/>
+              <a:rPr lang="en-US"/>
               <a:t>Edit Master text styles</a:t>
             </a:r>
           </a:p>
@@ -1004,7 +1007,7 @@
           <a:p>
             <a:fld id="{F464B8FA-1A17-4AED-A84C-27E00D534571}" type="datetimeFigureOut">
               <a:rPr lang="en-US" smtClean="0"/>
-              <a:t>2/4/2020</a:t>
+              <a:t>1/13/2022</a:t>
             </a:fld>
             <a:endParaRPr lang="en-US"/>
           </a:p>
@@ -1098,10 +1101,9 @@
           <a:lstStyle/>
           <a:p>
             <a:r>
-              <a:rPr lang="en-US" smtClean="0"/>
+              <a:rPr lang="en-US"/>
               <a:t>Click to edit Master title style</a:t>
             </a:r>
-            <a:endParaRPr lang="en-US"/>
           </a:p>
         </p:txBody>
       </p:sp>
@@ -1127,38 +1129,37 @@
           <a:p>
             <a:pPr lvl="0"/>
             <a:r>
-              <a:rPr lang="en-US" smtClean="0"/>
+              <a:rPr lang="en-US"/>
               <a:t>Edit Master text styles</a:t>
             </a:r>
           </a:p>
           <a:p>
             <a:pPr lvl="1"/>
             <a:r>
-              <a:rPr lang="en-US" smtClean="0"/>
+              <a:rPr lang="en-US"/>
               <a:t>Second level</a:t>
             </a:r>
           </a:p>
           <a:p>
             <a:pPr lvl="2"/>
             <a:r>
-              <a:rPr lang="en-US" smtClean="0"/>
+              <a:rPr lang="en-US"/>
               <a:t>Third level</a:t>
             </a:r>
           </a:p>
           <a:p>
             <a:pPr lvl="3"/>
             <a:r>
-              <a:rPr lang="en-US" smtClean="0"/>
+              <a:rPr lang="en-US"/>
               <a:t>Fourth level</a:t>
             </a:r>
           </a:p>
           <a:p>
             <a:pPr lvl="4"/>
             <a:r>
-              <a:rPr lang="en-US" smtClean="0"/>
+              <a:rPr lang="en-US"/>
               <a:t>Fifth level</a:t>
             </a:r>
-            <a:endParaRPr lang="en-US"/>
           </a:p>
         </p:txBody>
       </p:sp>
@@ -1184,38 +1185,37 @@
           <a:p>
             <a:pPr lvl="0"/>
             <a:r>
-              <a:rPr lang="en-US" smtClean="0"/>
+              <a:rPr lang="en-US"/>
               <a:t>Edit Master text styles</a:t>
             </a:r>
           </a:p>
           <a:p>
             <a:pPr lvl="1"/>
             <a:r>
-              <a:rPr lang="en-US" smtClean="0"/>
+              <a:rPr lang="en-US"/>
               <a:t>Second level</a:t>
             </a:r>
           </a:p>
           <a:p>
             <a:pPr lvl="2"/>
             <a:r>
-              <a:rPr lang="en-US" smtClean="0"/>
+              <a:rPr lang="en-US"/>
               <a:t>Third level</a:t>
             </a:r>
           </a:p>
           <a:p>
             <a:pPr lvl="3"/>
             <a:r>
-              <a:rPr lang="en-US" smtClean="0"/>
+              <a:rPr lang="en-US"/>
               <a:t>Fourth level</a:t>
             </a:r>
           </a:p>
           <a:p>
             <a:pPr lvl="4"/>
             <a:r>
-              <a:rPr lang="en-US" smtClean="0"/>
+              <a:rPr lang="en-US"/>
               <a:t>Fifth level</a:t>
             </a:r>
-            <a:endParaRPr lang="en-US"/>
           </a:p>
         </p:txBody>
       </p:sp>
@@ -1236,7 +1236,7 @@
           <a:p>
             <a:fld id="{F464B8FA-1A17-4AED-A84C-27E00D534571}" type="datetimeFigureOut">
               <a:rPr lang="en-US" smtClean="0"/>
-              <a:t>2/4/2020</a:t>
+              <a:t>1/13/2022</a:t>
             </a:fld>
             <a:endParaRPr lang="en-US"/>
           </a:p>
@@ -1335,10 +1335,9 @@
           <a:lstStyle/>
           <a:p>
             <a:r>
-              <a:rPr lang="en-US" smtClean="0"/>
+              <a:rPr lang="en-US"/>
               <a:t>Click to edit Master title style</a:t>
             </a:r>
-            <a:endParaRPr lang="en-US"/>
           </a:p>
         </p:txBody>
       </p:sp>
@@ -1401,7 +1400,7 @@
           <a:p>
             <a:pPr lvl="0"/>
             <a:r>
-              <a:rPr lang="en-US" smtClean="0"/>
+              <a:rPr lang="en-US"/>
               <a:t>Edit Master text styles</a:t>
             </a:r>
           </a:p>
@@ -1429,38 +1428,37 @@
           <a:p>
             <a:pPr lvl="0"/>
             <a:r>
-              <a:rPr lang="en-US" smtClean="0"/>
+              <a:rPr lang="en-US"/>
               <a:t>Edit Master text styles</a:t>
             </a:r>
           </a:p>
           <a:p>
             <a:pPr lvl="1"/>
             <a:r>
-              <a:rPr lang="en-US" smtClean="0"/>
+              <a:rPr lang="en-US"/>
               <a:t>Second level</a:t>
             </a:r>
           </a:p>
           <a:p>
             <a:pPr lvl="2"/>
             <a:r>
-              <a:rPr lang="en-US" smtClean="0"/>
+              <a:rPr lang="en-US"/>
               <a:t>Third level</a:t>
             </a:r>
           </a:p>
           <a:p>
             <a:pPr lvl="3"/>
             <a:r>
-              <a:rPr lang="en-US" smtClean="0"/>
+              <a:rPr lang="en-US"/>
               <a:t>Fourth level</a:t>
             </a:r>
           </a:p>
           <a:p>
             <a:pPr lvl="4"/>
             <a:r>
-              <a:rPr lang="en-US" smtClean="0"/>
+              <a:rPr lang="en-US"/>
               <a:t>Fifth level</a:t>
             </a:r>
-            <a:endParaRPr lang="en-US"/>
           </a:p>
         </p:txBody>
       </p:sp>
@@ -1523,7 +1521,7 @@
           <a:p>
             <a:pPr lvl="0"/>
             <a:r>
-              <a:rPr lang="en-US" smtClean="0"/>
+              <a:rPr lang="en-US"/>
               <a:t>Edit Master text styles</a:t>
             </a:r>
           </a:p>
@@ -1551,38 +1549,37 @@
           <a:p>
             <a:pPr lvl="0"/>
             <a:r>
-              <a:rPr lang="en-US" smtClean="0"/>
+              <a:rPr lang="en-US"/>
               <a:t>Edit Master text styles</a:t>
             </a:r>
           </a:p>
           <a:p>
             <a:pPr lvl="1"/>
             <a:r>
-              <a:rPr lang="en-US" smtClean="0"/>
+              <a:rPr lang="en-US"/>
               <a:t>Second level</a:t>
             </a:r>
           </a:p>
           <a:p>
             <a:pPr lvl="2"/>
             <a:r>
-              <a:rPr lang="en-US" smtClean="0"/>
+              <a:rPr lang="en-US"/>
               <a:t>Third level</a:t>
             </a:r>
           </a:p>
           <a:p>
             <a:pPr lvl="3"/>
             <a:r>
-              <a:rPr lang="en-US" smtClean="0"/>
+              <a:rPr lang="en-US"/>
               <a:t>Fourth level</a:t>
             </a:r>
           </a:p>
           <a:p>
             <a:pPr lvl="4"/>
             <a:r>
-              <a:rPr lang="en-US" smtClean="0"/>
+              <a:rPr lang="en-US"/>
               <a:t>Fifth level</a:t>
             </a:r>
-            <a:endParaRPr lang="en-US"/>
           </a:p>
         </p:txBody>
       </p:sp>
@@ -1603,7 +1600,7 @@
           <a:p>
             <a:fld id="{F464B8FA-1A17-4AED-A84C-27E00D534571}" type="datetimeFigureOut">
               <a:rPr lang="en-US" smtClean="0"/>
-              <a:t>2/4/2020</a:t>
+              <a:t>1/13/2022</a:t>
             </a:fld>
             <a:endParaRPr lang="en-US"/>
           </a:p>
@@ -1697,10 +1694,9 @@
           <a:lstStyle/>
           <a:p>
             <a:r>
-              <a:rPr lang="en-US" smtClean="0"/>
+              <a:rPr lang="en-US"/>
               <a:t>Click to edit Master title style</a:t>
             </a:r>
-            <a:endParaRPr lang="en-US"/>
           </a:p>
         </p:txBody>
       </p:sp>
@@ -1721,7 +1717,7 @@
           <a:p>
             <a:fld id="{F464B8FA-1A17-4AED-A84C-27E00D534571}" type="datetimeFigureOut">
               <a:rPr lang="en-US" smtClean="0"/>
-              <a:t>2/4/2020</a:t>
+              <a:t>1/13/2022</a:t>
             </a:fld>
             <a:endParaRPr lang="en-US"/>
           </a:p>
@@ -1816,7 +1812,7 @@
           <a:p>
             <a:fld id="{F464B8FA-1A17-4AED-A84C-27E00D534571}" type="datetimeFigureOut">
               <a:rPr lang="en-US" smtClean="0"/>
-              <a:t>2/4/2020</a:t>
+              <a:t>1/13/2022</a:t>
             </a:fld>
             <a:endParaRPr lang="en-US"/>
           </a:p>
@@ -1919,10 +1915,9 @@
           </a:lstStyle>
           <a:p>
             <a:r>
-              <a:rPr lang="en-US" smtClean="0"/>
+              <a:rPr lang="en-US"/>
               <a:t>Click to edit Master title style</a:t>
             </a:r>
-            <a:endParaRPr lang="en-US"/>
           </a:p>
         </p:txBody>
       </p:sp>
@@ -1976,38 +1971,37 @@
           <a:p>
             <a:pPr lvl="0"/>
             <a:r>
-              <a:rPr lang="en-US" smtClean="0"/>
+              <a:rPr lang="en-US"/>
               <a:t>Edit Master text styles</a:t>
             </a:r>
           </a:p>
           <a:p>
             <a:pPr lvl="1"/>
             <a:r>
-              <a:rPr lang="en-US" smtClean="0"/>
+              <a:rPr lang="en-US"/>
               <a:t>Second level</a:t>
             </a:r>
           </a:p>
           <a:p>
             <a:pPr lvl="2"/>
             <a:r>
-              <a:rPr lang="en-US" smtClean="0"/>
+              <a:rPr lang="en-US"/>
               <a:t>Third level</a:t>
             </a:r>
           </a:p>
           <a:p>
             <a:pPr lvl="3"/>
             <a:r>
-              <a:rPr lang="en-US" smtClean="0"/>
+              <a:rPr lang="en-US"/>
               <a:t>Fourth level</a:t>
             </a:r>
           </a:p>
           <a:p>
             <a:pPr lvl="4"/>
             <a:r>
-              <a:rPr lang="en-US" smtClean="0"/>
+              <a:rPr lang="en-US"/>
               <a:t>Fifth level</a:t>
             </a:r>
-            <a:endParaRPr lang="en-US"/>
           </a:p>
         </p:txBody>
       </p:sp>
@@ -2070,7 +2064,7 @@
           <a:p>
             <a:pPr lvl="0"/>
             <a:r>
-              <a:rPr lang="en-US" smtClean="0"/>
+              <a:rPr lang="en-US"/>
               <a:t>Edit Master text styles</a:t>
             </a:r>
           </a:p>
@@ -2093,7 +2087,7 @@
           <a:p>
             <a:fld id="{F464B8FA-1A17-4AED-A84C-27E00D534571}" type="datetimeFigureOut">
               <a:rPr lang="en-US" smtClean="0"/>
-              <a:t>2/4/2020</a:t>
+              <a:t>1/13/2022</a:t>
             </a:fld>
             <a:endParaRPr lang="en-US"/>
           </a:p>
@@ -2196,10 +2190,9 @@
           </a:lstStyle>
           <a:p>
             <a:r>
-              <a:rPr lang="en-US" smtClean="0"/>
+              <a:rPr lang="en-US"/>
               <a:t>Click to edit Master title style</a:t>
             </a:r>
-            <a:endParaRPr lang="en-US"/>
           </a:p>
         </p:txBody>
       </p:sp>
@@ -2323,7 +2316,7 @@
           <a:p>
             <a:pPr lvl="0"/>
             <a:r>
-              <a:rPr lang="en-US" smtClean="0"/>
+              <a:rPr lang="en-US"/>
               <a:t>Edit Master text styles</a:t>
             </a:r>
           </a:p>
@@ -2346,7 +2339,7 @@
           <a:p>
             <a:fld id="{F464B8FA-1A17-4AED-A84C-27E00D534571}" type="datetimeFigureOut">
               <a:rPr lang="en-US" smtClean="0"/>
-              <a:t>2/4/2020</a:t>
+              <a:t>1/13/2022</a:t>
             </a:fld>
             <a:endParaRPr lang="en-US"/>
           </a:p>
@@ -2411,9 +2404,36 @@
 <p:sldMaster xmlns:a="http://schemas.openxmlformats.org/drawingml/2006/main" xmlns:r="http://schemas.openxmlformats.org/officeDocument/2006/relationships" xmlns:p="http://schemas.openxmlformats.org/presentationml/2006/main">
   <p:cSld>
     <p:bg>
-      <p:bgRef idx="1001">
-        <a:schemeClr val="bg1"/>
-      </p:bgRef>
+      <p:bgPr>
+        <a:gradFill flip="none" rotWithShape="1">
+          <a:gsLst>
+            <a:gs pos="0">
+              <a:schemeClr val="tx1"/>
+            </a:gs>
+            <a:gs pos="74000">
+              <a:schemeClr val="accent1">
+                <a:lumMod val="45000"/>
+                <a:lumOff val="55000"/>
+              </a:schemeClr>
+            </a:gs>
+            <a:gs pos="83000">
+              <a:schemeClr val="accent1">
+                <a:lumMod val="45000"/>
+                <a:lumOff val="55000"/>
+              </a:schemeClr>
+            </a:gs>
+            <a:gs pos="100000">
+              <a:schemeClr val="accent1">
+                <a:lumMod val="30000"/>
+                <a:lumOff val="70000"/>
+              </a:schemeClr>
+            </a:gs>
+          </a:gsLst>
+          <a:lin ang="5400000" scaled="1"/>
+          <a:tileRect/>
+        </a:gradFill>
+        <a:effectLst/>
+      </p:bgPr>
     </p:bg>
     <p:spTree>
       <p:nvGrpSpPr>
@@ -2455,10 +2475,9 @@
           <a:lstStyle/>
           <a:p>
             <a:r>
-              <a:rPr lang="en-US" smtClean="0"/>
+              <a:rPr lang="en-US"/>
               <a:t>Click to edit Master title style</a:t>
             </a:r>
-            <a:endParaRPr lang="en-US"/>
           </a:p>
         </p:txBody>
       </p:sp>
@@ -2489,38 +2508,37 @@
           <a:p>
             <a:pPr lvl="0"/>
             <a:r>
-              <a:rPr lang="en-US" smtClean="0"/>
+              <a:rPr lang="en-US"/>
               <a:t>Edit Master text styles</a:t>
             </a:r>
           </a:p>
           <a:p>
             <a:pPr lvl="1"/>
             <a:r>
-              <a:rPr lang="en-US" smtClean="0"/>
+              <a:rPr lang="en-US"/>
               <a:t>Second level</a:t>
             </a:r>
           </a:p>
           <a:p>
             <a:pPr lvl="2"/>
             <a:r>
-              <a:rPr lang="en-US" smtClean="0"/>
+              <a:rPr lang="en-US"/>
               <a:t>Third level</a:t>
             </a:r>
           </a:p>
           <a:p>
             <a:pPr lvl="3"/>
             <a:r>
-              <a:rPr lang="en-US" smtClean="0"/>
+              <a:rPr lang="en-US"/>
               <a:t>Fourth level</a:t>
             </a:r>
           </a:p>
           <a:p>
             <a:pPr lvl="4"/>
             <a:r>
-              <a:rPr lang="en-US" smtClean="0"/>
+              <a:rPr lang="en-US"/>
               <a:t>Fifth level</a:t>
             </a:r>
-            <a:endParaRPr lang="en-US"/>
           </a:p>
         </p:txBody>
       </p:sp>
@@ -2559,7 +2577,7 @@
           <a:p>
             <a:fld id="{F464B8FA-1A17-4AED-A84C-27E00D534571}" type="datetimeFigureOut">
               <a:rPr lang="en-US" smtClean="0"/>
-              <a:t>2/4/2020</a:t>
+              <a:t>1/13/2022</a:t>
             </a:fld>
             <a:endParaRPr lang="en-US"/>
           </a:p>
@@ -2950,37 +2968,6 @@
 <file path=ppt/slides/slide1.xml><?xml version="1.0" encoding="utf-8"?>
 <p:sld xmlns:a="http://schemas.openxmlformats.org/drawingml/2006/main" xmlns:r="http://schemas.openxmlformats.org/officeDocument/2006/relationships" xmlns:p="http://schemas.openxmlformats.org/presentationml/2006/main">
   <p:cSld>
-    <p:bg>
-      <p:bgPr>
-        <a:gradFill>
-          <a:gsLst>
-            <a:gs pos="0">
-              <a:schemeClr val="tx1"/>
-            </a:gs>
-            <a:gs pos="74000">
-              <a:schemeClr val="accent1">
-                <a:lumMod val="45000"/>
-                <a:lumOff val="55000"/>
-              </a:schemeClr>
-            </a:gs>
-            <a:gs pos="83000">
-              <a:schemeClr val="accent1">
-                <a:lumMod val="45000"/>
-                <a:lumOff val="55000"/>
-              </a:schemeClr>
-            </a:gs>
-            <a:gs pos="100000">
-              <a:schemeClr val="accent1">
-                <a:lumMod val="30000"/>
-                <a:lumOff val="70000"/>
-              </a:schemeClr>
-            </a:gs>
-          </a:gsLst>
-          <a:lin ang="5400000" scaled="1"/>
-        </a:gradFill>
-        <a:effectLst/>
-      </p:bgPr>
-    </p:bg>
     <p:spTree>
       <p:nvGrpSpPr>
         <p:cNvPr id="1" name=""/>
@@ -3003,7 +2990,7 @@
         </p:nvSpPr>
         <p:spPr>
           <a:xfrm>
-            <a:off x="979714" y="1343608"/>
+            <a:off x="1161553" y="651022"/>
             <a:ext cx="2862802" cy="2777978"/>
           </a:xfrm>
           <a:prstGeom prst="ellipse">
@@ -3089,7 +3076,7 @@
         </p:nvSpPr>
         <p:spPr>
           <a:xfrm>
-            <a:off x="3698740" y="3819331"/>
+            <a:off x="307943" y="4080022"/>
             <a:ext cx="2862802" cy="2777978"/>
           </a:xfrm>
           <a:prstGeom prst="ellipse">
@@ -3132,7 +3119,7 @@
         </p:nvSpPr>
         <p:spPr>
           <a:xfrm>
-            <a:off x="9461240" y="4450701"/>
+            <a:off x="9886661" y="4606833"/>
             <a:ext cx="2061641" cy="2041143"/>
           </a:xfrm>
           <a:prstGeom prst="ellipse">
@@ -3171,6 +3158,2139 @@
     <p:extLst>
       <p:ext uri="{BB962C8B-B14F-4D97-AF65-F5344CB8AC3E}">
         <p14:creationId xmlns:p14="http://schemas.microsoft.com/office/powerpoint/2010/main" val="1133445207"/>
+      </p:ext>
+    </p:extLst>
+  </p:cSld>
+  <p:clrMapOvr>
+    <a:masterClrMapping/>
+  </p:clrMapOvr>
+</p:sld>
+</file>
+
+<file path=ppt/slides/slide2.xml><?xml version="1.0" encoding="utf-8"?>
+<p:sld xmlns:a="http://schemas.openxmlformats.org/drawingml/2006/main" xmlns:r="http://schemas.openxmlformats.org/officeDocument/2006/relationships" xmlns:p="http://schemas.openxmlformats.org/presentationml/2006/main">
+  <p:cSld>
+    <p:spTree>
+      <p:nvGrpSpPr>
+        <p:cNvPr id="1" name=""/>
+        <p:cNvGrpSpPr/>
+        <p:nvPr/>
+      </p:nvGrpSpPr>
+      <p:grpSpPr>
+        <a:xfrm>
+          <a:off x="0" y="0"/>
+          <a:ext cx="0" cy="0"/>
+          <a:chOff x="0" y="0"/>
+          <a:chExt cx="0" cy="0"/>
+        </a:xfrm>
+      </p:grpSpPr>
+      <p:sp>
+        <p:nvSpPr>
+          <p:cNvPr id="4" name="Oval 3"/>
+          <p:cNvSpPr/>
+          <p:nvPr/>
+        </p:nvSpPr>
+        <p:spPr>
+          <a:xfrm>
+            <a:off x="1161553" y="651022"/>
+            <a:ext cx="2862802" cy="2777978"/>
+          </a:xfrm>
+          <a:prstGeom prst="ellipse">
+            <a:avLst/>
+          </a:prstGeom>
+          <a:solidFill>
+            <a:srgbClr val="FFFF66"/>
+          </a:solidFill>
+        </p:spPr>
+        <p:style>
+          <a:lnRef idx="2">
+            <a:schemeClr val="accent1">
+              <a:shade val="50000"/>
+            </a:schemeClr>
+          </a:lnRef>
+          <a:fillRef idx="1">
+            <a:schemeClr val="accent1"/>
+          </a:fillRef>
+          <a:effectRef idx="0">
+            <a:schemeClr val="accent1"/>
+          </a:effectRef>
+          <a:fontRef idx="minor">
+            <a:schemeClr val="lt1"/>
+          </a:fontRef>
+        </p:style>
+        <p:txBody>
+          <a:bodyPr rtlCol="0" anchor="ctr"/>
+          <a:lstStyle/>
+          <a:p>
+            <a:pPr algn="ctr"/>
+            <a:endParaRPr lang="en-US"/>
+          </a:p>
+        </p:txBody>
+      </p:sp>
+      <p:sp>
+        <p:nvSpPr>
+          <p:cNvPr id="6" name="Oval 5"/>
+          <p:cNvSpPr/>
+          <p:nvPr/>
+        </p:nvSpPr>
+        <p:spPr>
+          <a:xfrm>
+            <a:off x="6035210" y="210024"/>
+            <a:ext cx="3906981" cy="4098174"/>
+          </a:xfrm>
+          <a:prstGeom prst="ellipse">
+            <a:avLst/>
+          </a:prstGeom>
+          <a:solidFill>
+            <a:srgbClr val="E7E200"/>
+          </a:solidFill>
+        </p:spPr>
+        <p:style>
+          <a:lnRef idx="2">
+            <a:schemeClr val="accent1">
+              <a:shade val="50000"/>
+            </a:schemeClr>
+          </a:lnRef>
+          <a:fillRef idx="1">
+            <a:schemeClr val="accent1"/>
+          </a:fillRef>
+          <a:effectRef idx="0">
+            <a:schemeClr val="accent1"/>
+          </a:effectRef>
+          <a:fontRef idx="minor">
+            <a:schemeClr val="lt1"/>
+          </a:fontRef>
+        </p:style>
+        <p:txBody>
+          <a:bodyPr rtlCol="0" anchor="ctr"/>
+          <a:lstStyle/>
+          <a:p>
+            <a:pPr algn="ctr"/>
+            <a:endParaRPr lang="en-US"/>
+          </a:p>
+        </p:txBody>
+      </p:sp>
+      <p:sp>
+        <p:nvSpPr>
+          <p:cNvPr id="7" name="Oval 6"/>
+          <p:cNvSpPr/>
+          <p:nvPr/>
+        </p:nvSpPr>
+        <p:spPr>
+          <a:xfrm>
+            <a:off x="307943" y="4080022"/>
+            <a:ext cx="2862802" cy="2777978"/>
+          </a:xfrm>
+          <a:prstGeom prst="ellipse">
+            <a:avLst/>
+          </a:prstGeom>
+          <a:solidFill>
+            <a:srgbClr val="FFFF00"/>
+          </a:solidFill>
+        </p:spPr>
+        <p:style>
+          <a:lnRef idx="2">
+            <a:schemeClr val="accent1">
+              <a:shade val="50000"/>
+            </a:schemeClr>
+          </a:lnRef>
+          <a:fillRef idx="1">
+            <a:schemeClr val="accent1"/>
+          </a:fillRef>
+          <a:effectRef idx="0">
+            <a:schemeClr val="accent1"/>
+          </a:effectRef>
+          <a:fontRef idx="minor">
+            <a:schemeClr val="lt1"/>
+          </a:fontRef>
+        </p:style>
+        <p:txBody>
+          <a:bodyPr rtlCol="0" anchor="ctr"/>
+          <a:lstStyle/>
+          <a:p>
+            <a:pPr algn="ctr"/>
+            <a:endParaRPr lang="en-US"/>
+          </a:p>
+        </p:txBody>
+      </p:sp>
+      <p:sp>
+        <p:nvSpPr>
+          <p:cNvPr id="8" name="Oval 7"/>
+          <p:cNvSpPr/>
+          <p:nvPr/>
+        </p:nvSpPr>
+        <p:spPr>
+          <a:xfrm>
+            <a:off x="9886661" y="4606833"/>
+            <a:ext cx="2061641" cy="2041143"/>
+          </a:xfrm>
+          <a:prstGeom prst="ellipse">
+            <a:avLst/>
+          </a:prstGeom>
+          <a:solidFill>
+            <a:srgbClr val="FEEC06"/>
+          </a:solidFill>
+        </p:spPr>
+        <p:style>
+          <a:lnRef idx="2">
+            <a:schemeClr val="accent1">
+              <a:shade val="50000"/>
+            </a:schemeClr>
+          </a:lnRef>
+          <a:fillRef idx="1">
+            <a:schemeClr val="accent1"/>
+          </a:fillRef>
+          <a:effectRef idx="0">
+            <a:schemeClr val="accent1"/>
+          </a:effectRef>
+          <a:fontRef idx="minor">
+            <a:schemeClr val="lt1"/>
+          </a:fontRef>
+        </p:style>
+        <p:txBody>
+          <a:bodyPr rtlCol="0" anchor="ctr"/>
+          <a:lstStyle/>
+          <a:p>
+            <a:pPr algn="ctr"/>
+            <a:endParaRPr lang="en-US"/>
+          </a:p>
+        </p:txBody>
+      </p:sp>
+    </p:spTree>
+    <p:extLst>
+      <p:ext uri="{BB962C8B-B14F-4D97-AF65-F5344CB8AC3E}">
+        <p14:creationId xmlns:p14="http://schemas.microsoft.com/office/powerpoint/2010/main" val="22882263"/>
+      </p:ext>
+    </p:extLst>
+  </p:cSld>
+  <p:clrMapOvr>
+    <a:masterClrMapping/>
+  </p:clrMapOvr>
+</p:sld>
+</file>
+
+<file path=ppt/slides/slide3.xml><?xml version="1.0" encoding="utf-8"?>
+<p:sld xmlns:a="http://schemas.openxmlformats.org/drawingml/2006/main" xmlns:r="http://schemas.openxmlformats.org/officeDocument/2006/relationships" xmlns:p="http://schemas.openxmlformats.org/presentationml/2006/main">
+  <p:cSld>
+    <p:spTree>
+      <p:nvGrpSpPr>
+        <p:cNvPr id="1" name=""/>
+        <p:cNvGrpSpPr/>
+        <p:nvPr/>
+      </p:nvGrpSpPr>
+      <p:grpSpPr>
+        <a:xfrm>
+          <a:off x="0" y="0"/>
+          <a:ext cx="0" cy="0"/>
+          <a:chOff x="0" y="0"/>
+          <a:chExt cx="0" cy="0"/>
+        </a:xfrm>
+      </p:grpSpPr>
+      <p:sp>
+        <p:nvSpPr>
+          <p:cNvPr id="4" name="Oval 3"/>
+          <p:cNvSpPr/>
+          <p:nvPr/>
+        </p:nvSpPr>
+        <p:spPr>
+          <a:xfrm>
+            <a:off x="979714" y="1343608"/>
+            <a:ext cx="2862802" cy="2777978"/>
+          </a:xfrm>
+          <a:prstGeom prst="ellipse">
+            <a:avLst/>
+          </a:prstGeom>
+          <a:solidFill>
+            <a:schemeClr val="accent1">
+              <a:lumMod val="60000"/>
+              <a:lumOff val="40000"/>
+            </a:schemeClr>
+          </a:solidFill>
+        </p:spPr>
+        <p:style>
+          <a:lnRef idx="2">
+            <a:schemeClr val="accent1">
+              <a:shade val="50000"/>
+            </a:schemeClr>
+          </a:lnRef>
+          <a:fillRef idx="1">
+            <a:schemeClr val="accent1"/>
+          </a:fillRef>
+          <a:effectRef idx="0">
+            <a:schemeClr val="accent1"/>
+          </a:effectRef>
+          <a:fontRef idx="minor">
+            <a:schemeClr val="lt1"/>
+          </a:fontRef>
+        </p:style>
+        <p:txBody>
+          <a:bodyPr rtlCol="0" anchor="ctr"/>
+          <a:lstStyle/>
+          <a:p>
+            <a:pPr algn="ctr"/>
+            <a:endParaRPr lang="en-US"/>
+          </a:p>
+        </p:txBody>
+      </p:sp>
+      <p:sp>
+        <p:nvSpPr>
+          <p:cNvPr id="6" name="Oval 5"/>
+          <p:cNvSpPr/>
+          <p:nvPr/>
+        </p:nvSpPr>
+        <p:spPr>
+          <a:xfrm>
+            <a:off x="6344093" y="260691"/>
+            <a:ext cx="3626452" cy="3273295"/>
+          </a:xfrm>
+          <a:prstGeom prst="ellipse">
+            <a:avLst/>
+          </a:prstGeom>
+          <a:solidFill>
+            <a:schemeClr val="accent5">
+              <a:lumMod val="75000"/>
+            </a:schemeClr>
+          </a:solidFill>
+        </p:spPr>
+        <p:style>
+          <a:lnRef idx="2">
+            <a:schemeClr val="accent1">
+              <a:shade val="50000"/>
+            </a:schemeClr>
+          </a:lnRef>
+          <a:fillRef idx="1">
+            <a:schemeClr val="accent1"/>
+          </a:fillRef>
+          <a:effectRef idx="0">
+            <a:schemeClr val="accent1"/>
+          </a:effectRef>
+          <a:fontRef idx="minor">
+            <a:schemeClr val="lt1"/>
+          </a:fontRef>
+        </p:style>
+        <p:txBody>
+          <a:bodyPr rtlCol="0" anchor="ctr"/>
+          <a:lstStyle/>
+          <a:p>
+            <a:pPr algn="ctr"/>
+            <a:endParaRPr lang="en-US"/>
+          </a:p>
+        </p:txBody>
+      </p:sp>
+      <p:sp>
+        <p:nvSpPr>
+          <p:cNvPr id="7" name="Oval 6"/>
+          <p:cNvSpPr/>
+          <p:nvPr/>
+        </p:nvSpPr>
+        <p:spPr>
+          <a:xfrm>
+            <a:off x="3698740" y="3819331"/>
+            <a:ext cx="2862802" cy="2777978"/>
+          </a:xfrm>
+          <a:prstGeom prst="ellipse">
+            <a:avLst/>
+          </a:prstGeom>
+          <a:solidFill>
+            <a:schemeClr val="accent1">
+              <a:lumMod val="75000"/>
+            </a:schemeClr>
+          </a:solidFill>
+        </p:spPr>
+        <p:style>
+          <a:lnRef idx="2">
+            <a:schemeClr val="accent1">
+              <a:shade val="50000"/>
+            </a:schemeClr>
+          </a:lnRef>
+          <a:fillRef idx="1">
+            <a:schemeClr val="accent1"/>
+          </a:fillRef>
+          <a:effectRef idx="0">
+            <a:schemeClr val="accent1"/>
+          </a:effectRef>
+          <a:fontRef idx="minor">
+            <a:schemeClr val="lt1"/>
+          </a:fontRef>
+        </p:style>
+        <p:txBody>
+          <a:bodyPr rtlCol="0" anchor="ctr"/>
+          <a:lstStyle/>
+          <a:p>
+            <a:pPr algn="ctr"/>
+            <a:endParaRPr lang="en-US"/>
+          </a:p>
+        </p:txBody>
+      </p:sp>
+      <p:sp>
+        <p:nvSpPr>
+          <p:cNvPr id="8" name="Oval 7"/>
+          <p:cNvSpPr/>
+          <p:nvPr/>
+        </p:nvSpPr>
+        <p:spPr>
+          <a:xfrm>
+            <a:off x="9461240" y="4450701"/>
+            <a:ext cx="2061641" cy="2041143"/>
+          </a:xfrm>
+          <a:prstGeom prst="ellipse">
+            <a:avLst/>
+          </a:prstGeom>
+          <a:solidFill>
+            <a:schemeClr val="accent1">
+              <a:lumMod val="75000"/>
+            </a:schemeClr>
+          </a:solidFill>
+        </p:spPr>
+        <p:style>
+          <a:lnRef idx="2">
+            <a:schemeClr val="accent1">
+              <a:shade val="50000"/>
+            </a:schemeClr>
+          </a:lnRef>
+          <a:fillRef idx="1">
+            <a:schemeClr val="accent1"/>
+          </a:fillRef>
+          <a:effectRef idx="0">
+            <a:schemeClr val="accent1"/>
+          </a:effectRef>
+          <a:fontRef idx="minor">
+            <a:schemeClr val="lt1"/>
+          </a:fontRef>
+        </p:style>
+        <p:txBody>
+          <a:bodyPr rtlCol="0" anchor="ctr"/>
+          <a:lstStyle/>
+          <a:p>
+            <a:pPr algn="ctr"/>
+            <a:endParaRPr lang="en-US"/>
+          </a:p>
+        </p:txBody>
+      </p:sp>
+    </p:spTree>
+    <p:extLst>
+      <p:ext uri="{BB962C8B-B14F-4D97-AF65-F5344CB8AC3E}">
+        <p14:creationId xmlns:p14="http://schemas.microsoft.com/office/powerpoint/2010/main" val="2423729316"/>
+      </p:ext>
+    </p:extLst>
+  </p:cSld>
+  <p:clrMapOvr>
+    <a:masterClrMapping/>
+  </p:clrMapOvr>
+</p:sld>
+</file>
+
+<file path=ppt/slides/slide4.xml><?xml version="1.0" encoding="utf-8"?>
+<p:sld xmlns:a="http://schemas.openxmlformats.org/drawingml/2006/main" xmlns:r="http://schemas.openxmlformats.org/officeDocument/2006/relationships" xmlns:p="http://schemas.openxmlformats.org/presentationml/2006/main">
+  <p:cSld>
+    <p:spTree>
+      <p:nvGrpSpPr>
+        <p:cNvPr id="1" name=""/>
+        <p:cNvGrpSpPr/>
+        <p:nvPr/>
+      </p:nvGrpSpPr>
+      <p:grpSpPr>
+        <a:xfrm>
+          <a:off x="0" y="0"/>
+          <a:ext cx="0" cy="0"/>
+          <a:chOff x="0" y="0"/>
+          <a:chExt cx="0" cy="0"/>
+        </a:xfrm>
+      </p:grpSpPr>
+      <p:sp>
+        <p:nvSpPr>
+          <p:cNvPr id="4" name="Oval 3"/>
+          <p:cNvSpPr/>
+          <p:nvPr/>
+        </p:nvSpPr>
+        <p:spPr>
+          <a:xfrm>
+            <a:off x="268539" y="372501"/>
+            <a:ext cx="2862802" cy="2777978"/>
+          </a:xfrm>
+          <a:prstGeom prst="ellipse">
+            <a:avLst/>
+          </a:prstGeom>
+          <a:solidFill>
+            <a:srgbClr val="FF0000"/>
+          </a:solidFill>
+        </p:spPr>
+        <p:style>
+          <a:lnRef idx="2">
+            <a:schemeClr val="accent1">
+              <a:shade val="50000"/>
+            </a:schemeClr>
+          </a:lnRef>
+          <a:fillRef idx="1">
+            <a:schemeClr val="accent1"/>
+          </a:fillRef>
+          <a:effectRef idx="0">
+            <a:schemeClr val="accent1"/>
+          </a:effectRef>
+          <a:fontRef idx="minor">
+            <a:schemeClr val="lt1"/>
+          </a:fontRef>
+        </p:style>
+        <p:txBody>
+          <a:bodyPr rtlCol="0" anchor="ctr"/>
+          <a:lstStyle/>
+          <a:p>
+            <a:pPr algn="ctr"/>
+            <a:endParaRPr lang="en-US"/>
+          </a:p>
+        </p:txBody>
+      </p:sp>
+      <p:sp>
+        <p:nvSpPr>
+          <p:cNvPr id="6" name="Oval 5"/>
+          <p:cNvSpPr/>
+          <p:nvPr/>
+        </p:nvSpPr>
+        <p:spPr>
+          <a:xfrm>
+            <a:off x="5706121" y="153317"/>
+            <a:ext cx="3906981" cy="4098174"/>
+          </a:xfrm>
+          <a:prstGeom prst="ellipse">
+            <a:avLst/>
+          </a:prstGeom>
+          <a:solidFill>
+            <a:srgbClr val="C00000"/>
+          </a:solidFill>
+        </p:spPr>
+        <p:style>
+          <a:lnRef idx="2">
+            <a:schemeClr val="accent1">
+              <a:shade val="50000"/>
+            </a:schemeClr>
+          </a:lnRef>
+          <a:fillRef idx="1">
+            <a:schemeClr val="accent1"/>
+          </a:fillRef>
+          <a:effectRef idx="0">
+            <a:schemeClr val="accent1"/>
+          </a:effectRef>
+          <a:fontRef idx="minor">
+            <a:schemeClr val="lt1"/>
+          </a:fontRef>
+        </p:style>
+        <p:txBody>
+          <a:bodyPr rtlCol="0" anchor="ctr"/>
+          <a:lstStyle/>
+          <a:p>
+            <a:pPr algn="ctr"/>
+            <a:endParaRPr lang="en-US"/>
+          </a:p>
+        </p:txBody>
+      </p:sp>
+      <p:sp>
+        <p:nvSpPr>
+          <p:cNvPr id="7" name="Oval 6"/>
+          <p:cNvSpPr/>
+          <p:nvPr/>
+        </p:nvSpPr>
+        <p:spPr>
+          <a:xfrm>
+            <a:off x="2047149" y="3707521"/>
+            <a:ext cx="2862802" cy="2777978"/>
+          </a:xfrm>
+          <a:prstGeom prst="ellipse">
+            <a:avLst/>
+          </a:prstGeom>
+          <a:solidFill>
+            <a:srgbClr val="FF4C33"/>
+          </a:solidFill>
+        </p:spPr>
+        <p:style>
+          <a:lnRef idx="2">
+            <a:schemeClr val="accent1">
+              <a:shade val="50000"/>
+            </a:schemeClr>
+          </a:lnRef>
+          <a:fillRef idx="1">
+            <a:schemeClr val="accent1"/>
+          </a:fillRef>
+          <a:effectRef idx="0">
+            <a:schemeClr val="accent1"/>
+          </a:effectRef>
+          <a:fontRef idx="minor">
+            <a:schemeClr val="lt1"/>
+          </a:fontRef>
+        </p:style>
+        <p:txBody>
+          <a:bodyPr rtlCol="0" anchor="ctr"/>
+          <a:lstStyle/>
+          <a:p>
+            <a:pPr algn="ctr"/>
+            <a:endParaRPr lang="en-US"/>
+          </a:p>
+        </p:txBody>
+      </p:sp>
+      <p:sp>
+        <p:nvSpPr>
+          <p:cNvPr id="8" name="Oval 7"/>
+          <p:cNvSpPr/>
+          <p:nvPr/>
+        </p:nvSpPr>
+        <p:spPr>
+          <a:xfrm>
+            <a:off x="10130359" y="4816857"/>
+            <a:ext cx="2061641" cy="2041143"/>
+          </a:xfrm>
+          <a:prstGeom prst="ellipse">
+            <a:avLst/>
+          </a:prstGeom>
+          <a:solidFill>
+            <a:srgbClr val="DE0000"/>
+          </a:solidFill>
+        </p:spPr>
+        <p:style>
+          <a:lnRef idx="2">
+            <a:schemeClr val="accent1">
+              <a:shade val="50000"/>
+            </a:schemeClr>
+          </a:lnRef>
+          <a:fillRef idx="1">
+            <a:schemeClr val="accent1"/>
+          </a:fillRef>
+          <a:effectRef idx="0">
+            <a:schemeClr val="accent1"/>
+          </a:effectRef>
+          <a:fontRef idx="minor">
+            <a:schemeClr val="lt1"/>
+          </a:fontRef>
+        </p:style>
+        <p:txBody>
+          <a:bodyPr rtlCol="0" anchor="ctr"/>
+          <a:lstStyle/>
+          <a:p>
+            <a:pPr algn="ctr"/>
+            <a:endParaRPr lang="en-US"/>
+          </a:p>
+        </p:txBody>
+      </p:sp>
+    </p:spTree>
+    <p:extLst>
+      <p:ext uri="{BB962C8B-B14F-4D97-AF65-F5344CB8AC3E}">
+        <p14:creationId xmlns:p14="http://schemas.microsoft.com/office/powerpoint/2010/main" val="925531579"/>
+      </p:ext>
+    </p:extLst>
+  </p:cSld>
+  <p:clrMapOvr>
+    <a:masterClrMapping/>
+  </p:clrMapOvr>
+</p:sld>
+</file>
+
+<file path=ppt/slides/slide5.xml><?xml version="1.0" encoding="utf-8"?>
+<p:sld xmlns:a="http://schemas.openxmlformats.org/drawingml/2006/main" xmlns:r="http://schemas.openxmlformats.org/officeDocument/2006/relationships" xmlns:p="http://schemas.openxmlformats.org/presentationml/2006/main">
+  <p:cSld>
+    <p:spTree>
+      <p:nvGrpSpPr>
+        <p:cNvPr id="1" name=""/>
+        <p:cNvGrpSpPr/>
+        <p:nvPr/>
+      </p:nvGrpSpPr>
+      <p:grpSpPr>
+        <a:xfrm>
+          <a:off x="0" y="0"/>
+          <a:ext cx="0" cy="0"/>
+          <a:chOff x="0" y="0"/>
+          <a:chExt cx="0" cy="0"/>
+        </a:xfrm>
+      </p:grpSpPr>
+      <p:sp>
+        <p:nvSpPr>
+          <p:cNvPr id="4" name="Oval 3"/>
+          <p:cNvSpPr/>
+          <p:nvPr/>
+        </p:nvSpPr>
+        <p:spPr>
+          <a:xfrm>
+            <a:off x="572772" y="2259111"/>
+            <a:ext cx="2862802" cy="2777978"/>
+          </a:xfrm>
+          <a:prstGeom prst="ellipse">
+            <a:avLst/>
+          </a:prstGeom>
+          <a:solidFill>
+            <a:srgbClr val="C00000"/>
+          </a:solidFill>
+        </p:spPr>
+        <p:style>
+          <a:lnRef idx="2">
+            <a:schemeClr val="accent1">
+              <a:shade val="50000"/>
+            </a:schemeClr>
+          </a:lnRef>
+          <a:fillRef idx="1">
+            <a:schemeClr val="accent1"/>
+          </a:fillRef>
+          <a:effectRef idx="0">
+            <a:schemeClr val="accent1"/>
+          </a:effectRef>
+          <a:fontRef idx="minor">
+            <a:schemeClr val="lt1"/>
+          </a:fontRef>
+        </p:style>
+        <p:txBody>
+          <a:bodyPr rtlCol="0" anchor="ctr"/>
+          <a:lstStyle/>
+          <a:p>
+            <a:pPr algn="ctr"/>
+            <a:endParaRPr lang="en-US"/>
+          </a:p>
+        </p:txBody>
+      </p:sp>
+      <p:sp>
+        <p:nvSpPr>
+          <p:cNvPr id="6" name="Oval 5"/>
+          <p:cNvSpPr/>
+          <p:nvPr/>
+        </p:nvSpPr>
+        <p:spPr>
+          <a:xfrm>
+            <a:off x="7204792" y="54080"/>
+            <a:ext cx="3906981" cy="4098174"/>
+          </a:xfrm>
+          <a:prstGeom prst="ellipse">
+            <a:avLst/>
+          </a:prstGeom>
+          <a:solidFill>
+            <a:srgbClr val="FF0000"/>
+          </a:solidFill>
+        </p:spPr>
+        <p:style>
+          <a:lnRef idx="2">
+            <a:schemeClr val="accent1">
+              <a:shade val="50000"/>
+            </a:schemeClr>
+          </a:lnRef>
+          <a:fillRef idx="1">
+            <a:schemeClr val="accent1"/>
+          </a:fillRef>
+          <a:effectRef idx="0">
+            <a:schemeClr val="accent1"/>
+          </a:effectRef>
+          <a:fontRef idx="minor">
+            <a:schemeClr val="lt1"/>
+          </a:fontRef>
+        </p:style>
+        <p:txBody>
+          <a:bodyPr rtlCol="0" anchor="ctr"/>
+          <a:lstStyle/>
+          <a:p>
+            <a:pPr algn="ctr"/>
+            <a:endParaRPr lang="en-US"/>
+          </a:p>
+        </p:txBody>
+      </p:sp>
+      <p:sp>
+        <p:nvSpPr>
+          <p:cNvPr id="7" name="Oval 6"/>
+          <p:cNvSpPr/>
+          <p:nvPr/>
+        </p:nvSpPr>
+        <p:spPr>
+          <a:xfrm>
+            <a:off x="3888782" y="1593582"/>
+            <a:ext cx="2862802" cy="2777978"/>
+          </a:xfrm>
+          <a:prstGeom prst="ellipse">
+            <a:avLst/>
+          </a:prstGeom>
+          <a:solidFill>
+            <a:srgbClr val="0070C0"/>
+          </a:solidFill>
+        </p:spPr>
+        <p:style>
+          <a:lnRef idx="2">
+            <a:schemeClr val="accent1">
+              <a:shade val="50000"/>
+            </a:schemeClr>
+          </a:lnRef>
+          <a:fillRef idx="1">
+            <a:schemeClr val="accent1"/>
+          </a:fillRef>
+          <a:effectRef idx="0">
+            <a:schemeClr val="accent1"/>
+          </a:effectRef>
+          <a:fontRef idx="minor">
+            <a:schemeClr val="lt1"/>
+          </a:fontRef>
+        </p:style>
+        <p:txBody>
+          <a:bodyPr rtlCol="0" anchor="ctr"/>
+          <a:lstStyle/>
+          <a:p>
+            <a:pPr algn="ctr"/>
+            <a:endParaRPr lang="en-US"/>
+          </a:p>
+        </p:txBody>
+      </p:sp>
+      <p:sp>
+        <p:nvSpPr>
+          <p:cNvPr id="8" name="Oval 7"/>
+          <p:cNvSpPr/>
+          <p:nvPr/>
+        </p:nvSpPr>
+        <p:spPr>
+          <a:xfrm>
+            <a:off x="9461240" y="4450701"/>
+            <a:ext cx="2061641" cy="2041143"/>
+          </a:xfrm>
+          <a:prstGeom prst="ellipse">
+            <a:avLst/>
+          </a:prstGeom>
+          <a:solidFill>
+            <a:schemeClr val="accent5">
+              <a:lumMod val="75000"/>
+            </a:schemeClr>
+          </a:solidFill>
+        </p:spPr>
+        <p:style>
+          <a:lnRef idx="2">
+            <a:schemeClr val="accent1">
+              <a:shade val="50000"/>
+            </a:schemeClr>
+          </a:lnRef>
+          <a:fillRef idx="1">
+            <a:schemeClr val="accent1"/>
+          </a:fillRef>
+          <a:effectRef idx="0">
+            <a:schemeClr val="accent1"/>
+          </a:effectRef>
+          <a:fontRef idx="minor">
+            <a:schemeClr val="lt1"/>
+          </a:fontRef>
+        </p:style>
+        <p:txBody>
+          <a:bodyPr rtlCol="0" anchor="ctr"/>
+          <a:lstStyle/>
+          <a:p>
+            <a:pPr algn="ctr"/>
+            <a:endParaRPr lang="en-US"/>
+          </a:p>
+        </p:txBody>
+      </p:sp>
+    </p:spTree>
+    <p:extLst>
+      <p:ext uri="{BB962C8B-B14F-4D97-AF65-F5344CB8AC3E}">
+        <p14:creationId xmlns:p14="http://schemas.microsoft.com/office/powerpoint/2010/main" val="2193705161"/>
+      </p:ext>
+    </p:extLst>
+  </p:cSld>
+  <p:clrMapOvr>
+    <a:masterClrMapping/>
+  </p:clrMapOvr>
+</p:sld>
+</file>
+
+<file path=ppt/slides/slide6.xml><?xml version="1.0" encoding="utf-8"?>
+<p:sld xmlns:a="http://schemas.openxmlformats.org/drawingml/2006/main" xmlns:r="http://schemas.openxmlformats.org/officeDocument/2006/relationships" xmlns:p="http://schemas.openxmlformats.org/presentationml/2006/main">
+  <p:cSld>
+    <p:spTree>
+      <p:nvGrpSpPr>
+        <p:cNvPr id="1" name=""/>
+        <p:cNvGrpSpPr/>
+        <p:nvPr/>
+      </p:nvGrpSpPr>
+      <p:grpSpPr>
+        <a:xfrm>
+          <a:off x="0" y="0"/>
+          <a:ext cx="0" cy="0"/>
+          <a:chOff x="0" y="0"/>
+          <a:chExt cx="0" cy="0"/>
+        </a:xfrm>
+      </p:grpSpPr>
+      <p:sp>
+        <p:nvSpPr>
+          <p:cNvPr id="4" name="Oval 3"/>
+          <p:cNvSpPr/>
+          <p:nvPr/>
+        </p:nvSpPr>
+        <p:spPr>
+          <a:xfrm>
+            <a:off x="1093062" y="976215"/>
+            <a:ext cx="2862802" cy="2777978"/>
+          </a:xfrm>
+          <a:prstGeom prst="ellipse">
+            <a:avLst/>
+          </a:prstGeom>
+          <a:solidFill>
+            <a:srgbClr val="C00000"/>
+          </a:solidFill>
+        </p:spPr>
+        <p:style>
+          <a:lnRef idx="2">
+            <a:schemeClr val="accent1">
+              <a:shade val="50000"/>
+            </a:schemeClr>
+          </a:lnRef>
+          <a:fillRef idx="1">
+            <a:schemeClr val="accent1"/>
+          </a:fillRef>
+          <a:effectRef idx="0">
+            <a:schemeClr val="accent1"/>
+          </a:effectRef>
+          <a:fontRef idx="minor">
+            <a:schemeClr val="lt1"/>
+          </a:fontRef>
+        </p:style>
+        <p:txBody>
+          <a:bodyPr rtlCol="0" anchor="ctr"/>
+          <a:lstStyle/>
+          <a:p>
+            <a:pPr algn="ctr"/>
+            <a:endParaRPr lang="en-US"/>
+          </a:p>
+        </p:txBody>
+      </p:sp>
+      <p:sp>
+        <p:nvSpPr>
+          <p:cNvPr id="6" name="Oval 5"/>
+          <p:cNvSpPr/>
+          <p:nvPr/>
+        </p:nvSpPr>
+        <p:spPr>
+          <a:xfrm>
+            <a:off x="7063023" y="132052"/>
+            <a:ext cx="3906981" cy="4098174"/>
+          </a:xfrm>
+          <a:prstGeom prst="ellipse">
+            <a:avLst/>
+          </a:prstGeom>
+          <a:solidFill>
+            <a:srgbClr val="FF0000"/>
+          </a:solidFill>
+        </p:spPr>
+        <p:style>
+          <a:lnRef idx="2">
+            <a:schemeClr val="accent1">
+              <a:shade val="50000"/>
+            </a:schemeClr>
+          </a:lnRef>
+          <a:fillRef idx="1">
+            <a:schemeClr val="accent1"/>
+          </a:fillRef>
+          <a:effectRef idx="0">
+            <a:schemeClr val="accent1"/>
+          </a:effectRef>
+          <a:fontRef idx="minor">
+            <a:schemeClr val="lt1"/>
+          </a:fontRef>
+        </p:style>
+        <p:txBody>
+          <a:bodyPr rtlCol="0" anchor="ctr"/>
+          <a:lstStyle/>
+          <a:p>
+            <a:pPr algn="ctr"/>
+            <a:endParaRPr lang="en-US"/>
+          </a:p>
+        </p:txBody>
+      </p:sp>
+      <p:sp>
+        <p:nvSpPr>
+          <p:cNvPr id="7" name="Oval 6"/>
+          <p:cNvSpPr/>
+          <p:nvPr/>
+        </p:nvSpPr>
+        <p:spPr>
+          <a:xfrm>
+            <a:off x="2320577" y="3968186"/>
+            <a:ext cx="2862802" cy="2777978"/>
+          </a:xfrm>
+          <a:prstGeom prst="ellipse">
+            <a:avLst/>
+          </a:prstGeom>
+          <a:solidFill>
+            <a:srgbClr val="0070C0"/>
+          </a:solidFill>
+        </p:spPr>
+        <p:style>
+          <a:lnRef idx="2">
+            <a:schemeClr val="accent1">
+              <a:shade val="50000"/>
+            </a:schemeClr>
+          </a:lnRef>
+          <a:fillRef idx="1">
+            <a:schemeClr val="accent1"/>
+          </a:fillRef>
+          <a:effectRef idx="0">
+            <a:schemeClr val="accent1"/>
+          </a:effectRef>
+          <a:fontRef idx="minor">
+            <a:schemeClr val="lt1"/>
+          </a:fontRef>
+        </p:style>
+        <p:txBody>
+          <a:bodyPr rtlCol="0" anchor="ctr"/>
+          <a:lstStyle/>
+          <a:p>
+            <a:pPr algn="ctr"/>
+            <a:endParaRPr lang="en-US"/>
+          </a:p>
+        </p:txBody>
+      </p:sp>
+      <p:sp>
+        <p:nvSpPr>
+          <p:cNvPr id="8" name="Oval 7"/>
+          <p:cNvSpPr/>
+          <p:nvPr/>
+        </p:nvSpPr>
+        <p:spPr>
+          <a:xfrm>
+            <a:off x="7985692" y="4436524"/>
+            <a:ext cx="2061641" cy="2041143"/>
+          </a:xfrm>
+          <a:prstGeom prst="ellipse">
+            <a:avLst/>
+          </a:prstGeom>
+          <a:solidFill>
+            <a:schemeClr val="accent5">
+              <a:lumMod val="75000"/>
+            </a:schemeClr>
+          </a:solidFill>
+        </p:spPr>
+        <p:style>
+          <a:lnRef idx="2">
+            <a:schemeClr val="accent1">
+              <a:shade val="50000"/>
+            </a:schemeClr>
+          </a:lnRef>
+          <a:fillRef idx="1">
+            <a:schemeClr val="accent1"/>
+          </a:fillRef>
+          <a:effectRef idx="0">
+            <a:schemeClr val="accent1"/>
+          </a:effectRef>
+          <a:fontRef idx="minor">
+            <a:schemeClr val="lt1"/>
+          </a:fontRef>
+        </p:style>
+        <p:txBody>
+          <a:bodyPr rtlCol="0" anchor="ctr"/>
+          <a:lstStyle/>
+          <a:p>
+            <a:pPr algn="ctr"/>
+            <a:endParaRPr lang="en-US"/>
+          </a:p>
+        </p:txBody>
+      </p:sp>
+      <p:sp>
+        <p:nvSpPr>
+          <p:cNvPr id="9" name="Oval 8">
+            <a:extLst>
+              <a:ext uri="{FF2B5EF4-FFF2-40B4-BE49-F238E27FC236}">
+                <a16:creationId xmlns:a16="http://schemas.microsoft.com/office/drawing/2014/main" id="{AD988837-411F-4174-AFC9-DCDFDEC079A4}"/>
+              </a:ext>
+            </a:extLst>
+          </p:cNvPr>
+          <p:cNvSpPr/>
+          <p:nvPr/>
+        </p:nvSpPr>
+        <p:spPr>
+          <a:xfrm>
+            <a:off x="4953554" y="2181139"/>
+            <a:ext cx="2061641" cy="2041143"/>
+          </a:xfrm>
+          <a:prstGeom prst="ellipse">
+            <a:avLst/>
+          </a:prstGeom>
+          <a:solidFill>
+            <a:srgbClr val="FFFF00"/>
+          </a:solidFill>
+        </p:spPr>
+        <p:style>
+          <a:lnRef idx="2">
+            <a:schemeClr val="accent1">
+              <a:shade val="50000"/>
+            </a:schemeClr>
+          </a:lnRef>
+          <a:fillRef idx="1">
+            <a:schemeClr val="accent1"/>
+          </a:fillRef>
+          <a:effectRef idx="0">
+            <a:schemeClr val="accent1"/>
+          </a:effectRef>
+          <a:fontRef idx="minor">
+            <a:schemeClr val="lt1"/>
+          </a:fontRef>
+        </p:style>
+        <p:txBody>
+          <a:bodyPr rtlCol="0" anchor="ctr"/>
+          <a:lstStyle/>
+          <a:p>
+            <a:pPr algn="ctr"/>
+            <a:endParaRPr lang="en-US"/>
+          </a:p>
+        </p:txBody>
+      </p:sp>
+    </p:spTree>
+    <p:extLst>
+      <p:ext uri="{BB962C8B-B14F-4D97-AF65-F5344CB8AC3E}">
+        <p14:creationId xmlns:p14="http://schemas.microsoft.com/office/powerpoint/2010/main" val="2696096234"/>
+      </p:ext>
+    </p:extLst>
+  </p:cSld>
+  <p:clrMapOvr>
+    <a:masterClrMapping/>
+  </p:clrMapOvr>
+</p:sld>
+</file>
+
+<file path=ppt/slides/slide7.xml><?xml version="1.0" encoding="utf-8"?>
+<p:sld xmlns:a="http://schemas.openxmlformats.org/drawingml/2006/main" xmlns:r="http://schemas.openxmlformats.org/officeDocument/2006/relationships" xmlns:p="http://schemas.openxmlformats.org/presentationml/2006/main">
+  <p:cSld>
+    <p:spTree>
+      <p:nvGrpSpPr>
+        <p:cNvPr id="1" name=""/>
+        <p:cNvGrpSpPr/>
+        <p:nvPr/>
+      </p:nvGrpSpPr>
+      <p:grpSpPr>
+        <a:xfrm>
+          <a:off x="0" y="0"/>
+          <a:ext cx="0" cy="0"/>
+          <a:chOff x="0" y="0"/>
+          <a:chExt cx="0" cy="0"/>
+        </a:xfrm>
+      </p:grpSpPr>
+      <p:sp>
+        <p:nvSpPr>
+          <p:cNvPr id="4" name="Oval 3"/>
+          <p:cNvSpPr/>
+          <p:nvPr/>
+        </p:nvSpPr>
+        <p:spPr>
+          <a:xfrm>
+            <a:off x="370048" y="296685"/>
+            <a:ext cx="2862802" cy="2777978"/>
+          </a:xfrm>
+          <a:prstGeom prst="ellipse">
+            <a:avLst/>
+          </a:prstGeom>
+          <a:solidFill>
+            <a:srgbClr val="00B050"/>
+          </a:solidFill>
+        </p:spPr>
+        <p:style>
+          <a:lnRef idx="2">
+            <a:schemeClr val="accent1">
+              <a:shade val="50000"/>
+            </a:schemeClr>
+          </a:lnRef>
+          <a:fillRef idx="1">
+            <a:schemeClr val="accent1"/>
+          </a:fillRef>
+          <a:effectRef idx="0">
+            <a:schemeClr val="accent1"/>
+          </a:effectRef>
+          <a:fontRef idx="minor">
+            <a:schemeClr val="lt1"/>
+          </a:fontRef>
+        </p:style>
+        <p:txBody>
+          <a:bodyPr rtlCol="0" anchor="ctr"/>
+          <a:lstStyle/>
+          <a:p>
+            <a:pPr algn="ctr"/>
+            <a:endParaRPr lang="en-US"/>
+          </a:p>
+        </p:txBody>
+      </p:sp>
+      <p:sp>
+        <p:nvSpPr>
+          <p:cNvPr id="6" name="Oval 5"/>
+          <p:cNvSpPr/>
+          <p:nvPr/>
+        </p:nvSpPr>
+        <p:spPr>
+          <a:xfrm>
+            <a:off x="8089729" y="404219"/>
+            <a:ext cx="3222413" cy="3296948"/>
+          </a:xfrm>
+          <a:prstGeom prst="ellipse">
+            <a:avLst/>
+          </a:prstGeom>
+          <a:solidFill>
+            <a:srgbClr val="DE0000"/>
+          </a:solidFill>
+        </p:spPr>
+        <p:style>
+          <a:lnRef idx="2">
+            <a:schemeClr val="accent1">
+              <a:shade val="50000"/>
+            </a:schemeClr>
+          </a:lnRef>
+          <a:fillRef idx="1">
+            <a:schemeClr val="accent1"/>
+          </a:fillRef>
+          <a:effectRef idx="0">
+            <a:schemeClr val="accent1"/>
+          </a:effectRef>
+          <a:fontRef idx="minor">
+            <a:schemeClr val="lt1"/>
+          </a:fontRef>
+        </p:style>
+        <p:txBody>
+          <a:bodyPr rtlCol="0" anchor="ctr"/>
+          <a:lstStyle/>
+          <a:p>
+            <a:pPr algn="ctr"/>
+            <a:endParaRPr lang="en-US">
+              <a:solidFill>
+                <a:srgbClr val="C00000"/>
+              </a:solidFill>
+            </a:endParaRPr>
+          </a:p>
+        </p:txBody>
+      </p:sp>
+      <p:sp>
+        <p:nvSpPr>
+          <p:cNvPr id="7" name="Oval 6"/>
+          <p:cNvSpPr/>
+          <p:nvPr/>
+        </p:nvSpPr>
+        <p:spPr>
+          <a:xfrm>
+            <a:off x="2341843" y="3493265"/>
+            <a:ext cx="2862802" cy="2777978"/>
+          </a:xfrm>
+          <a:prstGeom prst="ellipse">
+            <a:avLst/>
+          </a:prstGeom>
+          <a:solidFill>
+            <a:srgbClr val="0070C0"/>
+          </a:solidFill>
+        </p:spPr>
+        <p:style>
+          <a:lnRef idx="2">
+            <a:schemeClr val="accent1">
+              <a:shade val="50000"/>
+            </a:schemeClr>
+          </a:lnRef>
+          <a:fillRef idx="1">
+            <a:schemeClr val="accent1"/>
+          </a:fillRef>
+          <a:effectRef idx="0">
+            <a:schemeClr val="accent1"/>
+          </a:effectRef>
+          <a:fontRef idx="minor">
+            <a:schemeClr val="lt1"/>
+          </a:fontRef>
+        </p:style>
+        <p:txBody>
+          <a:bodyPr rtlCol="0" anchor="ctr"/>
+          <a:lstStyle/>
+          <a:p>
+            <a:pPr algn="ctr"/>
+            <a:endParaRPr lang="en-US"/>
+          </a:p>
+        </p:txBody>
+      </p:sp>
+      <p:sp>
+        <p:nvSpPr>
+          <p:cNvPr id="8" name="Oval 7"/>
+          <p:cNvSpPr/>
+          <p:nvPr/>
+        </p:nvSpPr>
+        <p:spPr>
+          <a:xfrm>
+            <a:off x="7387980" y="4157315"/>
+            <a:ext cx="2061641" cy="2041143"/>
+          </a:xfrm>
+          <a:prstGeom prst="ellipse">
+            <a:avLst/>
+          </a:prstGeom>
+          <a:solidFill>
+            <a:schemeClr val="accent5">
+              <a:lumMod val="75000"/>
+            </a:schemeClr>
+          </a:solidFill>
+        </p:spPr>
+        <p:style>
+          <a:lnRef idx="2">
+            <a:schemeClr val="accent1">
+              <a:shade val="50000"/>
+            </a:schemeClr>
+          </a:lnRef>
+          <a:fillRef idx="1">
+            <a:schemeClr val="accent1"/>
+          </a:fillRef>
+          <a:effectRef idx="0">
+            <a:schemeClr val="accent1"/>
+          </a:effectRef>
+          <a:fontRef idx="minor">
+            <a:schemeClr val="lt1"/>
+          </a:fontRef>
+        </p:style>
+        <p:txBody>
+          <a:bodyPr rtlCol="0" anchor="ctr"/>
+          <a:lstStyle/>
+          <a:p>
+            <a:pPr algn="ctr"/>
+            <a:endParaRPr lang="en-US"/>
+          </a:p>
+        </p:txBody>
+      </p:sp>
+      <p:sp>
+        <p:nvSpPr>
+          <p:cNvPr id="9" name="Oval 8">
+            <a:extLst>
+              <a:ext uri="{FF2B5EF4-FFF2-40B4-BE49-F238E27FC236}">
+                <a16:creationId xmlns:a16="http://schemas.microsoft.com/office/drawing/2014/main" id="{AD988837-411F-4174-AFC9-DCDFDEC079A4}"/>
+              </a:ext>
+            </a:extLst>
+          </p:cNvPr>
+          <p:cNvSpPr/>
+          <p:nvPr/>
+        </p:nvSpPr>
+        <p:spPr>
+          <a:xfrm>
+            <a:off x="3554726" y="404219"/>
+            <a:ext cx="2061641" cy="2041143"/>
+          </a:xfrm>
+          <a:prstGeom prst="ellipse">
+            <a:avLst/>
+          </a:prstGeom>
+          <a:solidFill>
+            <a:srgbClr val="FFFF00"/>
+          </a:solidFill>
+        </p:spPr>
+        <p:style>
+          <a:lnRef idx="2">
+            <a:schemeClr val="accent1">
+              <a:shade val="50000"/>
+            </a:schemeClr>
+          </a:lnRef>
+          <a:fillRef idx="1">
+            <a:schemeClr val="accent1"/>
+          </a:fillRef>
+          <a:effectRef idx="0">
+            <a:schemeClr val="accent1"/>
+          </a:effectRef>
+          <a:fontRef idx="minor">
+            <a:schemeClr val="lt1"/>
+          </a:fontRef>
+        </p:style>
+        <p:txBody>
+          <a:bodyPr rtlCol="0" anchor="ctr"/>
+          <a:lstStyle/>
+          <a:p>
+            <a:pPr algn="ctr"/>
+            <a:endParaRPr lang="en-US"/>
+          </a:p>
+        </p:txBody>
+      </p:sp>
+      <p:sp>
+        <p:nvSpPr>
+          <p:cNvPr id="2" name="Rectangle 1">
+            <a:extLst>
+              <a:ext uri="{FF2B5EF4-FFF2-40B4-BE49-F238E27FC236}">
+                <a16:creationId xmlns:a16="http://schemas.microsoft.com/office/drawing/2014/main" id="{23F9B9EF-1B2D-40FB-B173-D8A5408F807C}"/>
+              </a:ext>
+            </a:extLst>
+          </p:cNvPr>
+          <p:cNvSpPr/>
+          <p:nvPr/>
+        </p:nvSpPr>
+        <p:spPr>
+          <a:xfrm>
+            <a:off x="9647275" y="4359350"/>
+            <a:ext cx="1842978" cy="1911894"/>
+          </a:xfrm>
+          <a:prstGeom prst="rect">
+            <a:avLst/>
+          </a:prstGeom>
+          <a:solidFill>
+            <a:srgbClr val="FFFF00"/>
+          </a:solidFill>
+        </p:spPr>
+        <p:style>
+          <a:lnRef idx="2">
+            <a:schemeClr val="accent1">
+              <a:shade val="50000"/>
+            </a:schemeClr>
+          </a:lnRef>
+          <a:fillRef idx="1">
+            <a:schemeClr val="accent1"/>
+          </a:fillRef>
+          <a:effectRef idx="0">
+            <a:schemeClr val="accent1"/>
+          </a:effectRef>
+          <a:fontRef idx="minor">
+            <a:schemeClr val="lt1"/>
+          </a:fontRef>
+        </p:style>
+        <p:txBody>
+          <a:bodyPr rtlCol="0" anchor="ctr"/>
+          <a:lstStyle/>
+          <a:p>
+            <a:pPr algn="ctr"/>
+            <a:endParaRPr lang="en-US"/>
+          </a:p>
+        </p:txBody>
+      </p:sp>
+      <p:sp>
+        <p:nvSpPr>
+          <p:cNvPr id="10" name="Rectangle 9">
+            <a:extLst>
+              <a:ext uri="{FF2B5EF4-FFF2-40B4-BE49-F238E27FC236}">
+                <a16:creationId xmlns:a16="http://schemas.microsoft.com/office/drawing/2014/main" id="{7BEB21B6-35A9-4D72-A8C6-B4DBC02E7508}"/>
+              </a:ext>
+            </a:extLst>
+          </p:cNvPr>
+          <p:cNvSpPr/>
+          <p:nvPr/>
+        </p:nvSpPr>
+        <p:spPr>
+          <a:xfrm>
+            <a:off x="92423" y="4131724"/>
+            <a:ext cx="1842978" cy="1911894"/>
+          </a:xfrm>
+          <a:prstGeom prst="rect">
+            <a:avLst/>
+          </a:prstGeom>
+          <a:solidFill>
+            <a:srgbClr val="DE0000"/>
+          </a:solidFill>
+        </p:spPr>
+        <p:style>
+          <a:lnRef idx="2">
+            <a:schemeClr val="accent1">
+              <a:shade val="50000"/>
+            </a:schemeClr>
+          </a:lnRef>
+          <a:fillRef idx="1">
+            <a:schemeClr val="accent1"/>
+          </a:fillRef>
+          <a:effectRef idx="0">
+            <a:schemeClr val="accent1"/>
+          </a:effectRef>
+          <a:fontRef idx="minor">
+            <a:schemeClr val="lt1"/>
+          </a:fontRef>
+        </p:style>
+        <p:txBody>
+          <a:bodyPr rtlCol="0" anchor="ctr"/>
+          <a:lstStyle/>
+          <a:p>
+            <a:pPr algn="ctr"/>
+            <a:endParaRPr lang="en-US">
+              <a:solidFill>
+                <a:srgbClr val="C00000"/>
+              </a:solidFill>
+            </a:endParaRPr>
+          </a:p>
+        </p:txBody>
+      </p:sp>
+      <p:sp>
+        <p:nvSpPr>
+          <p:cNvPr id="11" name="Rectangle 10">
+            <a:extLst>
+              <a:ext uri="{FF2B5EF4-FFF2-40B4-BE49-F238E27FC236}">
+                <a16:creationId xmlns:a16="http://schemas.microsoft.com/office/drawing/2014/main" id="{5207ED72-8EF9-4163-9571-3E2D170C1C47}"/>
+              </a:ext>
+            </a:extLst>
+          </p:cNvPr>
+          <p:cNvSpPr/>
+          <p:nvPr/>
+        </p:nvSpPr>
+        <p:spPr>
+          <a:xfrm>
+            <a:off x="5268448" y="4095300"/>
+            <a:ext cx="1842978" cy="1911894"/>
+          </a:xfrm>
+          <a:prstGeom prst="rect">
+            <a:avLst/>
+          </a:prstGeom>
+          <a:solidFill>
+            <a:srgbClr val="00B050"/>
+          </a:solidFill>
+        </p:spPr>
+        <p:style>
+          <a:lnRef idx="2">
+            <a:schemeClr val="accent1">
+              <a:shade val="50000"/>
+            </a:schemeClr>
+          </a:lnRef>
+          <a:fillRef idx="1">
+            <a:schemeClr val="accent1"/>
+          </a:fillRef>
+          <a:effectRef idx="0">
+            <a:schemeClr val="accent1"/>
+          </a:effectRef>
+          <a:fontRef idx="minor">
+            <a:schemeClr val="lt1"/>
+          </a:fontRef>
+        </p:style>
+        <p:txBody>
+          <a:bodyPr rtlCol="0" anchor="ctr"/>
+          <a:lstStyle/>
+          <a:p>
+            <a:pPr algn="ctr"/>
+            <a:endParaRPr lang="en-US"/>
+          </a:p>
+        </p:txBody>
+      </p:sp>
+      <p:sp>
+        <p:nvSpPr>
+          <p:cNvPr id="12" name="Rectangle 11">
+            <a:extLst>
+              <a:ext uri="{FF2B5EF4-FFF2-40B4-BE49-F238E27FC236}">
+                <a16:creationId xmlns:a16="http://schemas.microsoft.com/office/drawing/2014/main" id="{5677730E-F6AA-4861-B56F-911A2B4B4837}"/>
+              </a:ext>
+            </a:extLst>
+          </p:cNvPr>
+          <p:cNvSpPr/>
+          <p:nvPr/>
+        </p:nvSpPr>
+        <p:spPr>
+          <a:xfrm>
+            <a:off x="5987918" y="1096746"/>
+            <a:ext cx="1842978" cy="1911894"/>
+          </a:xfrm>
+          <a:prstGeom prst="rect">
+            <a:avLst/>
+          </a:prstGeom>
+          <a:solidFill>
+            <a:srgbClr val="0070C0"/>
+          </a:solidFill>
+        </p:spPr>
+        <p:style>
+          <a:lnRef idx="2">
+            <a:schemeClr val="accent1">
+              <a:shade val="50000"/>
+            </a:schemeClr>
+          </a:lnRef>
+          <a:fillRef idx="1">
+            <a:schemeClr val="accent1"/>
+          </a:fillRef>
+          <a:effectRef idx="0">
+            <a:schemeClr val="accent1"/>
+          </a:effectRef>
+          <a:fontRef idx="minor">
+            <a:schemeClr val="lt1"/>
+          </a:fontRef>
+        </p:style>
+        <p:txBody>
+          <a:bodyPr rtlCol="0" anchor="ctr"/>
+          <a:lstStyle/>
+          <a:p>
+            <a:pPr algn="ctr"/>
+            <a:endParaRPr lang="en-US"/>
+          </a:p>
+        </p:txBody>
+      </p:sp>
+    </p:spTree>
+    <p:extLst>
+      <p:ext uri="{BB962C8B-B14F-4D97-AF65-F5344CB8AC3E}">
+        <p14:creationId xmlns:p14="http://schemas.microsoft.com/office/powerpoint/2010/main" val="1542775493"/>
+      </p:ext>
+    </p:extLst>
+  </p:cSld>
+  <p:clrMapOvr>
+    <a:masterClrMapping/>
+  </p:clrMapOvr>
+</p:sld>
+</file>
+
+<file path=ppt/slides/slide8.xml><?xml version="1.0" encoding="utf-8"?>
+<p:sld xmlns:a="http://schemas.openxmlformats.org/drawingml/2006/main" xmlns:r="http://schemas.openxmlformats.org/officeDocument/2006/relationships" xmlns:p="http://schemas.openxmlformats.org/presentationml/2006/main">
+  <p:cSld>
+    <p:spTree>
+      <p:nvGrpSpPr>
+        <p:cNvPr id="1" name=""/>
+        <p:cNvGrpSpPr/>
+        <p:nvPr/>
+      </p:nvGrpSpPr>
+      <p:grpSpPr>
+        <a:xfrm>
+          <a:off x="0" y="0"/>
+          <a:ext cx="0" cy="0"/>
+          <a:chOff x="0" y="0"/>
+          <a:chExt cx="0" cy="0"/>
+        </a:xfrm>
+      </p:grpSpPr>
+      <p:sp>
+        <p:nvSpPr>
+          <p:cNvPr id="4" name="Oval 3"/>
+          <p:cNvSpPr/>
+          <p:nvPr/>
+        </p:nvSpPr>
+        <p:spPr>
+          <a:xfrm>
+            <a:off x="1372960" y="4597361"/>
+            <a:ext cx="1777729" cy="1673882"/>
+          </a:xfrm>
+          <a:prstGeom prst="ellipse">
+            <a:avLst/>
+          </a:prstGeom>
+          <a:solidFill>
+            <a:srgbClr val="00B050"/>
+          </a:solidFill>
+        </p:spPr>
+        <p:style>
+          <a:lnRef idx="2">
+            <a:schemeClr val="accent1">
+              <a:shade val="50000"/>
+            </a:schemeClr>
+          </a:lnRef>
+          <a:fillRef idx="1">
+            <a:schemeClr val="accent1"/>
+          </a:fillRef>
+          <a:effectRef idx="0">
+            <a:schemeClr val="accent1"/>
+          </a:effectRef>
+          <a:fontRef idx="minor">
+            <a:schemeClr val="lt1"/>
+          </a:fontRef>
+        </p:style>
+        <p:txBody>
+          <a:bodyPr rtlCol="0" anchor="ctr"/>
+          <a:lstStyle/>
+          <a:p>
+            <a:pPr algn="ctr"/>
+            <a:endParaRPr lang="en-US"/>
+          </a:p>
+        </p:txBody>
+      </p:sp>
+      <p:sp>
+        <p:nvSpPr>
+          <p:cNvPr id="6" name="Oval 5"/>
+          <p:cNvSpPr/>
+          <p:nvPr/>
+        </p:nvSpPr>
+        <p:spPr>
+          <a:xfrm>
+            <a:off x="5614543" y="1545849"/>
+            <a:ext cx="1777729" cy="1566348"/>
+          </a:xfrm>
+          <a:prstGeom prst="ellipse">
+            <a:avLst/>
+          </a:prstGeom>
+          <a:solidFill>
+            <a:srgbClr val="DE0000"/>
+          </a:solidFill>
+        </p:spPr>
+        <p:style>
+          <a:lnRef idx="2">
+            <a:schemeClr val="accent1">
+              <a:shade val="50000"/>
+            </a:schemeClr>
+          </a:lnRef>
+          <a:fillRef idx="1">
+            <a:schemeClr val="accent1"/>
+          </a:fillRef>
+          <a:effectRef idx="0">
+            <a:schemeClr val="accent1"/>
+          </a:effectRef>
+          <a:fontRef idx="minor">
+            <a:schemeClr val="lt1"/>
+          </a:fontRef>
+        </p:style>
+        <p:txBody>
+          <a:bodyPr rtlCol="0" anchor="ctr"/>
+          <a:lstStyle/>
+          <a:p>
+            <a:pPr algn="ctr"/>
+            <a:endParaRPr lang="en-US">
+              <a:solidFill>
+                <a:srgbClr val="C00000"/>
+              </a:solidFill>
+            </a:endParaRPr>
+          </a:p>
+        </p:txBody>
+      </p:sp>
+      <p:sp>
+        <p:nvSpPr>
+          <p:cNvPr id="7" name="Oval 6"/>
+          <p:cNvSpPr/>
+          <p:nvPr/>
+        </p:nvSpPr>
+        <p:spPr>
+          <a:xfrm>
+            <a:off x="4194112" y="3008639"/>
+            <a:ext cx="1592204" cy="1539479"/>
+          </a:xfrm>
+          <a:prstGeom prst="ellipse">
+            <a:avLst/>
+          </a:prstGeom>
+          <a:solidFill>
+            <a:srgbClr val="0070C0"/>
+          </a:solidFill>
+        </p:spPr>
+        <p:style>
+          <a:lnRef idx="2">
+            <a:schemeClr val="accent1">
+              <a:shade val="50000"/>
+            </a:schemeClr>
+          </a:lnRef>
+          <a:fillRef idx="1">
+            <a:schemeClr val="accent1"/>
+          </a:fillRef>
+          <a:effectRef idx="0">
+            <a:schemeClr val="accent1"/>
+          </a:effectRef>
+          <a:fontRef idx="minor">
+            <a:schemeClr val="lt1"/>
+          </a:fontRef>
+        </p:style>
+        <p:txBody>
+          <a:bodyPr rtlCol="0" anchor="ctr"/>
+          <a:lstStyle/>
+          <a:p>
+            <a:pPr algn="ctr"/>
+            <a:endParaRPr lang="en-US"/>
+          </a:p>
+        </p:txBody>
+      </p:sp>
+      <p:sp>
+        <p:nvSpPr>
+          <p:cNvPr id="8" name="Oval 7"/>
+          <p:cNvSpPr/>
+          <p:nvPr/>
+        </p:nvSpPr>
+        <p:spPr>
+          <a:xfrm>
+            <a:off x="10177147" y="4600922"/>
+            <a:ext cx="1498245" cy="1566347"/>
+          </a:xfrm>
+          <a:prstGeom prst="ellipse">
+            <a:avLst/>
+          </a:prstGeom>
+          <a:solidFill>
+            <a:schemeClr val="accent5">
+              <a:lumMod val="75000"/>
+            </a:schemeClr>
+          </a:solidFill>
+        </p:spPr>
+        <p:style>
+          <a:lnRef idx="2">
+            <a:schemeClr val="accent1">
+              <a:shade val="50000"/>
+            </a:schemeClr>
+          </a:lnRef>
+          <a:fillRef idx="1">
+            <a:schemeClr val="accent1"/>
+          </a:fillRef>
+          <a:effectRef idx="0">
+            <a:schemeClr val="accent1"/>
+          </a:effectRef>
+          <a:fontRef idx="minor">
+            <a:schemeClr val="lt1"/>
+          </a:fontRef>
+        </p:style>
+        <p:txBody>
+          <a:bodyPr rtlCol="0" anchor="ctr"/>
+          <a:lstStyle/>
+          <a:p>
+            <a:pPr algn="ctr"/>
+            <a:endParaRPr lang="en-US"/>
+          </a:p>
+        </p:txBody>
+      </p:sp>
+      <p:sp>
+        <p:nvSpPr>
+          <p:cNvPr id="9" name="Oval 8">
+            <a:extLst>
+              <a:ext uri="{FF2B5EF4-FFF2-40B4-BE49-F238E27FC236}">
+                <a16:creationId xmlns:a16="http://schemas.microsoft.com/office/drawing/2014/main" id="{AD988837-411F-4174-AFC9-DCDFDEC079A4}"/>
+              </a:ext>
+            </a:extLst>
+          </p:cNvPr>
+          <p:cNvSpPr/>
+          <p:nvPr/>
+        </p:nvSpPr>
+        <p:spPr>
+          <a:xfrm>
+            <a:off x="834153" y="501504"/>
+            <a:ext cx="1592203" cy="1753465"/>
+          </a:xfrm>
+          <a:prstGeom prst="ellipse">
+            <a:avLst/>
+          </a:prstGeom>
+          <a:solidFill>
+            <a:srgbClr val="FFFF00"/>
+          </a:solidFill>
+        </p:spPr>
+        <p:style>
+          <a:lnRef idx="2">
+            <a:schemeClr val="accent1">
+              <a:shade val="50000"/>
+            </a:schemeClr>
+          </a:lnRef>
+          <a:fillRef idx="1">
+            <a:schemeClr val="accent1"/>
+          </a:fillRef>
+          <a:effectRef idx="0">
+            <a:schemeClr val="accent1"/>
+          </a:effectRef>
+          <a:fontRef idx="minor">
+            <a:schemeClr val="lt1"/>
+          </a:fontRef>
+        </p:style>
+        <p:txBody>
+          <a:bodyPr rtlCol="0" anchor="ctr"/>
+          <a:lstStyle/>
+          <a:p>
+            <a:pPr algn="ctr"/>
+            <a:endParaRPr lang="en-US"/>
+          </a:p>
+        </p:txBody>
+      </p:sp>
+      <p:sp>
+        <p:nvSpPr>
+          <p:cNvPr id="2" name="Rectangle 1">
+            <a:extLst>
+              <a:ext uri="{FF2B5EF4-FFF2-40B4-BE49-F238E27FC236}">
+                <a16:creationId xmlns:a16="http://schemas.microsoft.com/office/drawing/2014/main" id="{23F9B9EF-1B2D-40FB-B173-D8A5408F807C}"/>
+              </a:ext>
+            </a:extLst>
+          </p:cNvPr>
+          <p:cNvSpPr/>
+          <p:nvPr/>
+        </p:nvSpPr>
+        <p:spPr>
+          <a:xfrm>
+            <a:off x="9585267" y="2254969"/>
+            <a:ext cx="1183760" cy="912435"/>
+          </a:xfrm>
+          <a:prstGeom prst="rect">
+            <a:avLst/>
+          </a:prstGeom>
+          <a:solidFill>
+            <a:srgbClr val="FFFF00"/>
+          </a:solidFill>
+        </p:spPr>
+        <p:style>
+          <a:lnRef idx="2">
+            <a:schemeClr val="accent1">
+              <a:shade val="50000"/>
+            </a:schemeClr>
+          </a:lnRef>
+          <a:fillRef idx="1">
+            <a:schemeClr val="accent1"/>
+          </a:fillRef>
+          <a:effectRef idx="0">
+            <a:schemeClr val="accent1"/>
+          </a:effectRef>
+          <a:fontRef idx="minor">
+            <a:schemeClr val="lt1"/>
+          </a:fontRef>
+        </p:style>
+        <p:txBody>
+          <a:bodyPr rtlCol="0" anchor="ctr"/>
+          <a:lstStyle/>
+          <a:p>
+            <a:pPr algn="ctr"/>
+            <a:endParaRPr lang="en-US"/>
+          </a:p>
+        </p:txBody>
+      </p:sp>
+      <p:sp>
+        <p:nvSpPr>
+          <p:cNvPr id="10" name="Rectangle 9">
+            <a:extLst>
+              <a:ext uri="{FF2B5EF4-FFF2-40B4-BE49-F238E27FC236}">
+                <a16:creationId xmlns:a16="http://schemas.microsoft.com/office/drawing/2014/main" id="{7BEB21B6-35A9-4D72-A8C6-B4DBC02E7508}"/>
+              </a:ext>
+            </a:extLst>
+          </p:cNvPr>
+          <p:cNvSpPr/>
+          <p:nvPr/>
+        </p:nvSpPr>
+        <p:spPr>
+          <a:xfrm>
+            <a:off x="1447480" y="2592059"/>
+            <a:ext cx="1653106" cy="1673881"/>
+          </a:xfrm>
+          <a:prstGeom prst="rect">
+            <a:avLst/>
+          </a:prstGeom>
+          <a:solidFill>
+            <a:srgbClr val="DE0000"/>
+          </a:solidFill>
+        </p:spPr>
+        <p:style>
+          <a:lnRef idx="2">
+            <a:schemeClr val="accent1">
+              <a:shade val="50000"/>
+            </a:schemeClr>
+          </a:lnRef>
+          <a:fillRef idx="1">
+            <a:schemeClr val="accent1"/>
+          </a:fillRef>
+          <a:effectRef idx="0">
+            <a:schemeClr val="accent1"/>
+          </a:effectRef>
+          <a:fontRef idx="minor">
+            <a:schemeClr val="lt1"/>
+          </a:fontRef>
+        </p:style>
+        <p:txBody>
+          <a:bodyPr rtlCol="0" anchor="ctr"/>
+          <a:lstStyle/>
+          <a:p>
+            <a:pPr algn="ctr"/>
+            <a:endParaRPr lang="en-US">
+              <a:solidFill>
+                <a:srgbClr val="C00000"/>
+              </a:solidFill>
+            </a:endParaRPr>
+          </a:p>
+        </p:txBody>
+      </p:sp>
+      <p:sp>
+        <p:nvSpPr>
+          <p:cNvPr id="11" name="Rectangle 10">
+            <a:extLst>
+              <a:ext uri="{FF2B5EF4-FFF2-40B4-BE49-F238E27FC236}">
+                <a16:creationId xmlns:a16="http://schemas.microsoft.com/office/drawing/2014/main" id="{5207ED72-8EF9-4163-9571-3E2D170C1C47}"/>
+              </a:ext>
+            </a:extLst>
+          </p:cNvPr>
+          <p:cNvSpPr/>
+          <p:nvPr/>
+        </p:nvSpPr>
+        <p:spPr>
+          <a:xfrm>
+            <a:off x="7817664" y="5010845"/>
+            <a:ext cx="1498246" cy="1456109"/>
+          </a:xfrm>
+          <a:prstGeom prst="rect">
+            <a:avLst/>
+          </a:prstGeom>
+          <a:solidFill>
+            <a:srgbClr val="00B050"/>
+          </a:solidFill>
+        </p:spPr>
+        <p:style>
+          <a:lnRef idx="2">
+            <a:schemeClr val="accent1">
+              <a:shade val="50000"/>
+            </a:schemeClr>
+          </a:lnRef>
+          <a:fillRef idx="1">
+            <a:schemeClr val="accent1"/>
+          </a:fillRef>
+          <a:effectRef idx="0">
+            <a:schemeClr val="accent1"/>
+          </a:effectRef>
+          <a:fontRef idx="minor">
+            <a:schemeClr val="lt1"/>
+          </a:fontRef>
+        </p:style>
+        <p:txBody>
+          <a:bodyPr rtlCol="0" anchor="ctr"/>
+          <a:lstStyle/>
+          <a:p>
+            <a:pPr algn="ctr"/>
+            <a:endParaRPr lang="en-US"/>
+          </a:p>
+        </p:txBody>
+      </p:sp>
+      <p:sp>
+        <p:nvSpPr>
+          <p:cNvPr id="12" name="Rectangle 11">
+            <a:extLst>
+              <a:ext uri="{FF2B5EF4-FFF2-40B4-BE49-F238E27FC236}">
+                <a16:creationId xmlns:a16="http://schemas.microsoft.com/office/drawing/2014/main" id="{5677730E-F6AA-4861-B56F-911A2B4B4837}"/>
+              </a:ext>
+            </a:extLst>
+          </p:cNvPr>
+          <p:cNvSpPr/>
+          <p:nvPr/>
+        </p:nvSpPr>
+        <p:spPr>
+          <a:xfrm>
+            <a:off x="6829624" y="3371261"/>
+            <a:ext cx="1125296" cy="1169206"/>
+          </a:xfrm>
+          <a:prstGeom prst="rect">
+            <a:avLst/>
+          </a:prstGeom>
+          <a:solidFill>
+            <a:srgbClr val="0070C0"/>
+          </a:solidFill>
+        </p:spPr>
+        <p:style>
+          <a:lnRef idx="2">
+            <a:schemeClr val="accent1">
+              <a:shade val="50000"/>
+            </a:schemeClr>
+          </a:lnRef>
+          <a:fillRef idx="1">
+            <a:schemeClr val="accent1"/>
+          </a:fillRef>
+          <a:effectRef idx="0">
+            <a:schemeClr val="accent1"/>
+          </a:effectRef>
+          <a:fontRef idx="minor">
+            <a:schemeClr val="lt1"/>
+          </a:fontRef>
+        </p:style>
+        <p:txBody>
+          <a:bodyPr rtlCol="0" anchor="ctr"/>
+          <a:lstStyle/>
+          <a:p>
+            <a:pPr algn="ctr"/>
+            <a:endParaRPr lang="en-US"/>
+          </a:p>
+        </p:txBody>
+      </p:sp>
+      <p:sp>
+        <p:nvSpPr>
+          <p:cNvPr id="13" name="Oval 12">
+            <a:extLst>
+              <a:ext uri="{FF2B5EF4-FFF2-40B4-BE49-F238E27FC236}">
+                <a16:creationId xmlns:a16="http://schemas.microsoft.com/office/drawing/2014/main" id="{E0952560-D394-4ABA-88CD-8A848A4FA4D6}"/>
+              </a:ext>
+            </a:extLst>
+          </p:cNvPr>
+          <p:cNvSpPr/>
+          <p:nvPr/>
+        </p:nvSpPr>
+        <p:spPr>
+          <a:xfrm>
+            <a:off x="3588057" y="323173"/>
+            <a:ext cx="1592204" cy="1539479"/>
+          </a:xfrm>
+          <a:prstGeom prst="ellipse">
+            <a:avLst/>
+          </a:prstGeom>
+          <a:solidFill>
+            <a:srgbClr val="0070C0"/>
+          </a:solidFill>
+        </p:spPr>
+        <p:style>
+          <a:lnRef idx="2">
+            <a:schemeClr val="accent1">
+              <a:shade val="50000"/>
+            </a:schemeClr>
+          </a:lnRef>
+          <a:fillRef idx="1">
+            <a:schemeClr val="accent1"/>
+          </a:fillRef>
+          <a:effectRef idx="0">
+            <a:schemeClr val="accent1"/>
+          </a:effectRef>
+          <a:fontRef idx="minor">
+            <a:schemeClr val="lt1"/>
+          </a:fontRef>
+        </p:style>
+        <p:txBody>
+          <a:bodyPr rtlCol="0" anchor="ctr"/>
+          <a:lstStyle/>
+          <a:p>
+            <a:pPr algn="ctr"/>
+            <a:endParaRPr lang="en-US"/>
+          </a:p>
+        </p:txBody>
+      </p:sp>
+      <p:sp>
+        <p:nvSpPr>
+          <p:cNvPr id="14" name="Oval 13">
+            <a:extLst>
+              <a:ext uri="{FF2B5EF4-FFF2-40B4-BE49-F238E27FC236}">
+                <a16:creationId xmlns:a16="http://schemas.microsoft.com/office/drawing/2014/main" id="{0ABB64E0-5762-451F-BD88-D15A24188EDC}"/>
+              </a:ext>
+            </a:extLst>
+          </p:cNvPr>
+          <p:cNvSpPr/>
+          <p:nvPr/>
+        </p:nvSpPr>
+        <p:spPr>
+          <a:xfrm>
+            <a:off x="8526572" y="455803"/>
+            <a:ext cx="1407217" cy="1274217"/>
+          </a:xfrm>
+          <a:prstGeom prst="ellipse">
+            <a:avLst/>
+          </a:prstGeom>
+          <a:solidFill>
+            <a:srgbClr val="0070C0"/>
+          </a:solidFill>
+        </p:spPr>
+        <p:style>
+          <a:lnRef idx="2">
+            <a:schemeClr val="accent1">
+              <a:shade val="50000"/>
+            </a:schemeClr>
+          </a:lnRef>
+          <a:fillRef idx="1">
+            <a:schemeClr val="accent1"/>
+          </a:fillRef>
+          <a:effectRef idx="0">
+            <a:schemeClr val="accent1"/>
+          </a:effectRef>
+          <a:fontRef idx="minor">
+            <a:schemeClr val="lt1"/>
+          </a:fontRef>
+        </p:style>
+        <p:txBody>
+          <a:bodyPr rtlCol="0" anchor="ctr"/>
+          <a:lstStyle/>
+          <a:p>
+            <a:pPr algn="ctr"/>
+            <a:endParaRPr lang="en-US"/>
+          </a:p>
+        </p:txBody>
+      </p:sp>
+      <p:sp>
+        <p:nvSpPr>
+          <p:cNvPr id="15" name="Oval 14">
+            <a:extLst>
+              <a:ext uri="{FF2B5EF4-FFF2-40B4-BE49-F238E27FC236}">
+                <a16:creationId xmlns:a16="http://schemas.microsoft.com/office/drawing/2014/main" id="{F4AC1DDD-BE9B-4ADD-A468-A6480C41538B}"/>
+              </a:ext>
+            </a:extLst>
+          </p:cNvPr>
+          <p:cNvSpPr/>
+          <p:nvPr/>
+        </p:nvSpPr>
+        <p:spPr>
+          <a:xfrm>
+            <a:off x="4990214" y="5010845"/>
+            <a:ext cx="1506257" cy="1539479"/>
+          </a:xfrm>
+          <a:prstGeom prst="ellipse">
+            <a:avLst/>
+          </a:prstGeom>
+          <a:solidFill>
+            <a:srgbClr val="FFFF00"/>
+          </a:solidFill>
+        </p:spPr>
+        <p:style>
+          <a:lnRef idx="2">
+            <a:schemeClr val="accent1">
+              <a:shade val="50000"/>
+            </a:schemeClr>
+          </a:lnRef>
+          <a:fillRef idx="1">
+            <a:schemeClr val="accent1"/>
+          </a:fillRef>
+          <a:effectRef idx="0">
+            <a:schemeClr val="accent1"/>
+          </a:effectRef>
+          <a:fontRef idx="minor">
+            <a:schemeClr val="lt1"/>
+          </a:fontRef>
+        </p:style>
+        <p:txBody>
+          <a:bodyPr rtlCol="0" anchor="ctr"/>
+          <a:lstStyle/>
+          <a:p>
+            <a:pPr algn="ctr"/>
+            <a:endParaRPr lang="en-US"/>
+          </a:p>
+        </p:txBody>
+      </p:sp>
+    </p:spTree>
+    <p:extLst>
+      <p:ext uri="{BB962C8B-B14F-4D97-AF65-F5344CB8AC3E}">
+        <p14:creationId xmlns:p14="http://schemas.microsoft.com/office/powerpoint/2010/main" val="872807132"/>
       </p:ext>
     </p:extLst>
   </p:cSld>

</xml_diff>